<commit_message>
web mockups ppt updated to include help/welcome mockups
</commit_message>
<xml_diff>
--- a/documents/design/TwoStep web mockups.pptx
+++ b/documents/design/TwoStep web mockups.pptx
@@ -12,6 +12,15 @@
     <p:sldId id="263" r:id="rId6"/>
     <p:sldId id="264" r:id="rId7"/>
     <p:sldId id="262" r:id="rId8"/>
+    <p:sldId id="265" r:id="rId9"/>
+    <p:sldId id="266" r:id="rId10"/>
+    <p:sldId id="267" r:id="rId11"/>
+    <p:sldId id="269" r:id="rId12"/>
+    <p:sldId id="270" r:id="rId13"/>
+    <p:sldId id="271" r:id="rId14"/>
+    <p:sldId id="268" r:id="rId15"/>
+    <p:sldId id="272" r:id="rId16"/>
+    <p:sldId id="273" r:id="rId17"/>
   </p:sldIdLst>
   <p:sldSz cx="9144000" cy="6858000" type="screen4x3"/>
   <p:notesSz cx="6858000" cy="9144000"/>
@@ -294,7 +303,7 @@
           <a:p>
             <a:fld id="{F64465BD-0C98-4ACB-8C97-0796EA9569E6}" type="datetimeFigureOut">
               <a:rPr lang="en-US" smtClean="0"/>
-              <a:t>8/14/2012</a:t>
+              <a:t>9/12/2012</a:t>
             </a:fld>
             <a:endParaRPr lang="en-US"/>
           </a:p>
@@ -464,7 +473,7 @@
           <a:p>
             <a:fld id="{F64465BD-0C98-4ACB-8C97-0796EA9569E6}" type="datetimeFigureOut">
               <a:rPr lang="en-US" smtClean="0"/>
-              <a:t>8/14/2012</a:t>
+              <a:t>9/12/2012</a:t>
             </a:fld>
             <a:endParaRPr lang="en-US"/>
           </a:p>
@@ -644,7 +653,7 @@
           <a:p>
             <a:fld id="{F64465BD-0C98-4ACB-8C97-0796EA9569E6}" type="datetimeFigureOut">
               <a:rPr lang="en-US" smtClean="0"/>
-              <a:t>8/14/2012</a:t>
+              <a:t>9/12/2012</a:t>
             </a:fld>
             <a:endParaRPr lang="en-US"/>
           </a:p>
@@ -814,7 +823,7 @@
           <a:p>
             <a:fld id="{F64465BD-0C98-4ACB-8C97-0796EA9569E6}" type="datetimeFigureOut">
               <a:rPr lang="en-US" smtClean="0"/>
-              <a:t>8/14/2012</a:t>
+              <a:t>9/12/2012</a:t>
             </a:fld>
             <a:endParaRPr lang="en-US"/>
           </a:p>
@@ -1060,7 +1069,7 @@
           <a:p>
             <a:fld id="{F64465BD-0C98-4ACB-8C97-0796EA9569E6}" type="datetimeFigureOut">
               <a:rPr lang="en-US" smtClean="0"/>
-              <a:t>8/14/2012</a:t>
+              <a:t>9/12/2012</a:t>
             </a:fld>
             <a:endParaRPr lang="en-US"/>
           </a:p>
@@ -1348,7 +1357,7 @@
           <a:p>
             <a:fld id="{F64465BD-0C98-4ACB-8C97-0796EA9569E6}" type="datetimeFigureOut">
               <a:rPr lang="en-US" smtClean="0"/>
-              <a:t>8/14/2012</a:t>
+              <a:t>9/12/2012</a:t>
             </a:fld>
             <a:endParaRPr lang="en-US"/>
           </a:p>
@@ -1770,7 +1779,7 @@
           <a:p>
             <a:fld id="{F64465BD-0C98-4ACB-8C97-0796EA9569E6}" type="datetimeFigureOut">
               <a:rPr lang="en-US" smtClean="0"/>
-              <a:t>8/14/2012</a:t>
+              <a:t>9/12/2012</a:t>
             </a:fld>
             <a:endParaRPr lang="en-US"/>
           </a:p>
@@ -1888,7 +1897,7 @@
           <a:p>
             <a:fld id="{F64465BD-0C98-4ACB-8C97-0796EA9569E6}" type="datetimeFigureOut">
               <a:rPr lang="en-US" smtClean="0"/>
-              <a:t>8/14/2012</a:t>
+              <a:t>9/12/2012</a:t>
             </a:fld>
             <a:endParaRPr lang="en-US"/>
           </a:p>
@@ -1983,7 +1992,7 @@
           <a:p>
             <a:fld id="{F64465BD-0C98-4ACB-8C97-0796EA9569E6}" type="datetimeFigureOut">
               <a:rPr lang="en-US" smtClean="0"/>
-              <a:t>8/14/2012</a:t>
+              <a:t>9/12/2012</a:t>
             </a:fld>
             <a:endParaRPr lang="en-US"/>
           </a:p>
@@ -2260,7 +2269,7 @@
           <a:p>
             <a:fld id="{F64465BD-0C98-4ACB-8C97-0796EA9569E6}" type="datetimeFigureOut">
               <a:rPr lang="en-US" smtClean="0"/>
-              <a:t>8/14/2012</a:t>
+              <a:t>9/12/2012</a:t>
             </a:fld>
             <a:endParaRPr lang="en-US"/>
           </a:p>
@@ -2513,7 +2522,7 @@
           <a:p>
             <a:fld id="{F64465BD-0C98-4ACB-8C97-0796EA9569E6}" type="datetimeFigureOut">
               <a:rPr lang="en-US" smtClean="0"/>
-              <a:t>8/14/2012</a:t>
+              <a:t>9/12/2012</a:t>
             </a:fld>
             <a:endParaRPr lang="en-US"/>
           </a:p>
@@ -2726,7 +2735,7 @@
           <a:p>
             <a:fld id="{F64465BD-0C98-4ACB-8C97-0796EA9569E6}" type="datetimeFigureOut">
               <a:rPr lang="en-US" smtClean="0"/>
-              <a:t>8/14/2012</a:t>
+              <a:t>9/12/2012</a:t>
             </a:fld>
             <a:endParaRPr lang="en-US"/>
           </a:p>
@@ -4104,6 +4113,2126 @@
 </p:sld>
 </file>
 
+<file path=ppt/slides/slide10.xml><?xml version="1.0" encoding="utf-8"?>
+<p:sld xmlns:a="http://schemas.openxmlformats.org/drawingml/2006/main" xmlns:r="http://schemas.openxmlformats.org/officeDocument/2006/relationships" xmlns:p="http://schemas.openxmlformats.org/presentationml/2006/main">
+  <p:cSld>
+    <p:spTree>
+      <p:nvGrpSpPr>
+        <p:cNvPr id="1" name=""/>
+        <p:cNvGrpSpPr/>
+        <p:nvPr/>
+      </p:nvGrpSpPr>
+      <p:grpSpPr>
+        <a:xfrm>
+          <a:off x="0" y="0"/>
+          <a:ext cx="0" cy="0"/>
+          <a:chOff x="0" y="0"/>
+          <a:chExt cx="0" cy="0"/>
+        </a:xfrm>
+      </p:grpSpPr>
+      <p:pic>
+        <p:nvPicPr>
+          <p:cNvPr id="1029" name="Picture 5"/>
+          <p:cNvPicPr>
+            <a:picLocks noChangeAspect="1" noChangeArrowheads="1"/>
+          </p:cNvPicPr>
+          <p:nvPr/>
+        </p:nvPicPr>
+        <p:blipFill>
+          <a:blip r:embed="rId2">
+            <a:extLst>
+              <a:ext uri="{28A0092B-C50C-407E-A947-70E740481C1C}">
+                <a14:useLocalDpi xmlns:a14="http://schemas.microsoft.com/office/drawing/2010/main" val="0"/>
+              </a:ext>
+            </a:extLst>
+          </a:blip>
+          <a:srcRect/>
+          <a:stretch>
+            <a:fillRect/>
+          </a:stretch>
+        </p:blipFill>
+        <p:spPr bwMode="auto">
+          <a:xfrm>
+            <a:off x="-790575" y="-61913"/>
+            <a:ext cx="10725150" cy="6981826"/>
+          </a:xfrm>
+          <a:prstGeom prst="rect">
+            <a:avLst/>
+          </a:prstGeom>
+          <a:noFill/>
+          <a:ln>
+            <a:noFill/>
+          </a:ln>
+          <a:effectLst/>
+          <a:extLst>
+            <a:ext uri="{909E8E84-426E-40DD-AFC4-6F175D3DCCD1}">
+              <a14:hiddenFill xmlns:a14="http://schemas.microsoft.com/office/drawing/2010/main">
+                <a:solidFill>
+                  <a:schemeClr val="accent1"/>
+                </a:solidFill>
+              </a14:hiddenFill>
+            </a:ext>
+            <a:ext uri="{91240B29-F687-4F45-9708-019B960494DF}">
+              <a14:hiddenLine xmlns:a14="http://schemas.microsoft.com/office/drawing/2010/main" w="9525">
+                <a:solidFill>
+                  <a:schemeClr val="tx1"/>
+                </a:solidFill>
+                <a:miter lim="800000"/>
+                <a:headEnd/>
+                <a:tailEnd/>
+              </a14:hiddenLine>
+            </a:ext>
+            <a:ext uri="{AF507438-7753-43E0-B8FC-AC1667EBCBE1}">
+              <a14:hiddenEffects xmlns:a14="http://schemas.microsoft.com/office/drawing/2010/main">
+                <a:effectLst>
+                  <a:outerShdw dist="35921" dir="2700000" algn="ctr" rotWithShape="0">
+                    <a:schemeClr val="bg2"/>
+                  </a:outerShdw>
+                </a:effectLst>
+              </a14:hiddenEffects>
+            </a:ext>
+          </a:extLst>
+        </p:spPr>
+      </p:pic>
+      <p:sp>
+        <p:nvSpPr>
+          <p:cNvPr id="6" name="TextBox 5"/>
+          <p:cNvSpPr txBox="1"/>
+          <p:nvPr/>
+        </p:nvSpPr>
+        <p:spPr>
+          <a:xfrm>
+            <a:off x="2133600" y="533400"/>
+            <a:ext cx="4153638" cy="461665"/>
+          </a:xfrm>
+          <a:prstGeom prst="rect">
+            <a:avLst/>
+          </a:prstGeom>
+          <a:noFill/>
+        </p:spPr>
+        <p:txBody>
+          <a:bodyPr wrap="none" rtlCol="0">
+            <a:spAutoFit/>
+          </a:bodyPr>
+          <a:lstStyle/>
+          <a:p>
+            <a:r>
+              <a:rPr lang="en-US" sz="2400" dirty="0" smtClean="0">
+                <a:latin typeface="Segoe UI Light" pitchFamily="34" charset="0"/>
+                <a:ea typeface="Adobe Myungjo Std M" pitchFamily="18" charset="-128"/>
+              </a:rPr>
+              <a:t>Hi Omri, Welcome to </a:t>
+            </a:r>
+            <a:r>
+              <a:rPr lang="en-US" sz="2400" dirty="0" err="1" smtClean="0">
+                <a:latin typeface="Segoe UI Light" pitchFamily="34" charset="0"/>
+                <a:ea typeface="Adobe Myungjo Std M" pitchFamily="18" charset="-128"/>
+              </a:rPr>
+              <a:t>TwoStep</a:t>
+            </a:r>
+            <a:r>
+              <a:rPr lang="en-US" sz="2400" dirty="0">
+                <a:latin typeface="Segoe UI Light" pitchFamily="34" charset="0"/>
+                <a:ea typeface="Adobe Myungjo Std M" pitchFamily="18" charset="-128"/>
+              </a:rPr>
+              <a:t>!</a:t>
+            </a:r>
+            <a:endParaRPr lang="en-US" sz="2000" dirty="0">
+              <a:latin typeface="Segoe UI Light" pitchFamily="34" charset="0"/>
+              <a:ea typeface="Adobe Myungjo Std M" pitchFamily="18" charset="-128"/>
+            </a:endParaRPr>
+          </a:p>
+        </p:txBody>
+      </p:sp>
+      <p:sp>
+        <p:nvSpPr>
+          <p:cNvPr id="7" name="TextBox 6"/>
+          <p:cNvSpPr txBox="1"/>
+          <p:nvPr/>
+        </p:nvSpPr>
+        <p:spPr>
+          <a:xfrm>
+            <a:off x="2499027" y="990600"/>
+            <a:ext cx="3977974" cy="338554"/>
+          </a:xfrm>
+          <a:prstGeom prst="rect">
+            <a:avLst/>
+          </a:prstGeom>
+          <a:noFill/>
+        </p:spPr>
+        <p:txBody>
+          <a:bodyPr wrap="square" rtlCol="0">
+            <a:spAutoFit/>
+          </a:bodyPr>
+          <a:lstStyle/>
+          <a:p>
+            <a:r>
+              <a:rPr lang="en-US" sz="1600" dirty="0" smtClean="0">
+                <a:latin typeface="Segoe UI Light" pitchFamily="34" charset="0"/>
+                <a:ea typeface="Adobe Myungjo Std M" pitchFamily="18" charset="-128"/>
+              </a:rPr>
+              <a:t>Here’s a short introduction to the product.  </a:t>
+            </a:r>
+          </a:p>
+        </p:txBody>
+      </p:sp>
+      <p:pic>
+        <p:nvPicPr>
+          <p:cNvPr id="1030" name="Picture 6"/>
+          <p:cNvPicPr>
+            <a:picLocks noChangeAspect="1" noChangeArrowheads="1"/>
+          </p:cNvPicPr>
+          <p:nvPr/>
+        </p:nvPicPr>
+        <p:blipFill>
+          <a:blip r:embed="rId3">
+            <a:extLst>
+              <a:ext uri="{28A0092B-C50C-407E-A947-70E740481C1C}">
+                <a14:useLocalDpi xmlns:a14="http://schemas.microsoft.com/office/drawing/2010/main" val="0"/>
+              </a:ext>
+            </a:extLst>
+          </a:blip>
+          <a:stretch>
+            <a:fillRect/>
+          </a:stretch>
+        </p:blipFill>
+        <p:spPr bwMode="auto">
+          <a:xfrm>
+            <a:off x="4950149" y="1447800"/>
+            <a:ext cx="1526851" cy="2353896"/>
+          </a:xfrm>
+          <a:prstGeom prst="rect">
+            <a:avLst/>
+          </a:prstGeom>
+          <a:noFill/>
+          <a:ln>
+            <a:noFill/>
+          </a:ln>
+          <a:effectLst/>
+          <a:extLst>
+            <a:ext uri="{909E8E84-426E-40DD-AFC4-6F175D3DCCD1}">
+              <a14:hiddenFill xmlns:a14="http://schemas.microsoft.com/office/drawing/2010/main">
+                <a:solidFill>
+                  <a:schemeClr val="accent1"/>
+                </a:solidFill>
+              </a14:hiddenFill>
+            </a:ext>
+            <a:ext uri="{91240B29-F687-4F45-9708-019B960494DF}">
+              <a14:hiddenLine xmlns:a14="http://schemas.microsoft.com/office/drawing/2010/main" w="9525">
+                <a:solidFill>
+                  <a:schemeClr val="tx1"/>
+                </a:solidFill>
+                <a:miter lim="800000"/>
+                <a:headEnd/>
+                <a:tailEnd/>
+              </a14:hiddenLine>
+            </a:ext>
+            <a:ext uri="{AF507438-7753-43E0-B8FC-AC1667EBCBE1}">
+              <a14:hiddenEffects xmlns:a14="http://schemas.microsoft.com/office/drawing/2010/main">
+                <a:effectLst>
+                  <a:outerShdw dist="35921" dir="2700000" algn="ctr" rotWithShape="0">
+                    <a:schemeClr val="bg2"/>
+                  </a:outerShdw>
+                </a:effectLst>
+              </a14:hiddenEffects>
+            </a:ext>
+          </a:extLst>
+        </p:spPr>
+      </p:pic>
+      <p:sp>
+        <p:nvSpPr>
+          <p:cNvPr id="2" name="TextBox 1"/>
+          <p:cNvSpPr txBox="1"/>
+          <p:nvPr/>
+        </p:nvSpPr>
+        <p:spPr>
+          <a:xfrm>
+            <a:off x="2590800" y="1457742"/>
+            <a:ext cx="2362200" cy="1384995"/>
+          </a:xfrm>
+          <a:prstGeom prst="rect">
+            <a:avLst/>
+          </a:prstGeom>
+          <a:noFill/>
+        </p:spPr>
+        <p:txBody>
+          <a:bodyPr wrap="square" rtlCol="0">
+            <a:spAutoFit/>
+          </a:bodyPr>
+          <a:lstStyle/>
+          <a:p>
+            <a:r>
+              <a:rPr lang="en-US" sz="1200" dirty="0" smtClean="0">
+                <a:latin typeface="Segoe UI Light" pitchFamily="34" charset="0"/>
+                <a:ea typeface="Adobe Myungjo Std M" pitchFamily="18" charset="-128"/>
+              </a:rPr>
+              <a:t>The pane on the right side of the dashboard is the Gallery.  You can click on the arrow on an Activity or Category to select the Install action, which will add that Activity or that entire Category of Activities to your Organizer.</a:t>
+            </a:r>
+            <a:endParaRPr lang="en-US" sz="1200" dirty="0">
+              <a:latin typeface="Segoe UI Light" pitchFamily="34" charset="0"/>
+              <a:ea typeface="Adobe Myungjo Std M" pitchFamily="18" charset="-128"/>
+            </a:endParaRPr>
+          </a:p>
+        </p:txBody>
+      </p:sp>
+    </p:spTree>
+    <p:extLst>
+      <p:ext uri="{BB962C8B-B14F-4D97-AF65-F5344CB8AC3E}">
+        <p14:creationId xmlns:p14="http://schemas.microsoft.com/office/powerpoint/2010/main" val="171796447"/>
+      </p:ext>
+    </p:extLst>
+  </p:cSld>
+  <p:clrMapOvr>
+    <a:masterClrMapping/>
+  </p:clrMapOvr>
+</p:sld>
+</file>
+
+<file path=ppt/slides/slide11.xml><?xml version="1.0" encoding="utf-8"?>
+<p:sld xmlns:a="http://schemas.openxmlformats.org/drawingml/2006/main" xmlns:r="http://schemas.openxmlformats.org/officeDocument/2006/relationships" xmlns:p="http://schemas.openxmlformats.org/presentationml/2006/main">
+  <p:cSld>
+    <p:spTree>
+      <p:nvGrpSpPr>
+        <p:cNvPr id="1" name=""/>
+        <p:cNvGrpSpPr/>
+        <p:nvPr/>
+      </p:nvGrpSpPr>
+      <p:grpSpPr>
+        <a:xfrm>
+          <a:off x="0" y="0"/>
+          <a:ext cx="0" cy="0"/>
+          <a:chOff x="0" y="0"/>
+          <a:chExt cx="0" cy="0"/>
+        </a:xfrm>
+      </p:grpSpPr>
+      <p:pic>
+        <p:nvPicPr>
+          <p:cNvPr id="1029" name="Picture 5"/>
+          <p:cNvPicPr>
+            <a:picLocks noChangeAspect="1" noChangeArrowheads="1"/>
+          </p:cNvPicPr>
+          <p:nvPr/>
+        </p:nvPicPr>
+        <p:blipFill>
+          <a:blip r:embed="rId2">
+            <a:extLst>
+              <a:ext uri="{28A0092B-C50C-407E-A947-70E740481C1C}">
+                <a14:useLocalDpi xmlns:a14="http://schemas.microsoft.com/office/drawing/2010/main" val="0"/>
+              </a:ext>
+            </a:extLst>
+          </a:blip>
+          <a:srcRect/>
+          <a:stretch>
+            <a:fillRect/>
+          </a:stretch>
+        </p:blipFill>
+        <p:spPr bwMode="auto">
+          <a:xfrm>
+            <a:off x="-790575" y="-61913"/>
+            <a:ext cx="10725150" cy="6981826"/>
+          </a:xfrm>
+          <a:prstGeom prst="rect">
+            <a:avLst/>
+          </a:prstGeom>
+          <a:noFill/>
+          <a:ln>
+            <a:noFill/>
+          </a:ln>
+          <a:effectLst/>
+          <a:extLst>
+            <a:ext uri="{909E8E84-426E-40DD-AFC4-6F175D3DCCD1}">
+              <a14:hiddenFill xmlns:a14="http://schemas.microsoft.com/office/drawing/2010/main">
+                <a:solidFill>
+                  <a:schemeClr val="accent1"/>
+                </a:solidFill>
+              </a14:hiddenFill>
+            </a:ext>
+            <a:ext uri="{91240B29-F687-4F45-9708-019B960494DF}">
+              <a14:hiddenLine xmlns:a14="http://schemas.microsoft.com/office/drawing/2010/main" w="9525">
+                <a:solidFill>
+                  <a:schemeClr val="tx1"/>
+                </a:solidFill>
+                <a:miter lim="800000"/>
+                <a:headEnd/>
+                <a:tailEnd/>
+              </a14:hiddenLine>
+            </a:ext>
+            <a:ext uri="{AF507438-7753-43E0-B8FC-AC1667EBCBE1}">
+              <a14:hiddenEffects xmlns:a14="http://schemas.microsoft.com/office/drawing/2010/main">
+                <a:effectLst>
+                  <a:outerShdw dist="35921" dir="2700000" algn="ctr" rotWithShape="0">
+                    <a:schemeClr val="bg2"/>
+                  </a:outerShdw>
+                </a:effectLst>
+              </a14:hiddenEffects>
+            </a:ext>
+          </a:extLst>
+        </p:spPr>
+      </p:pic>
+      <p:sp>
+        <p:nvSpPr>
+          <p:cNvPr id="6" name="TextBox 5"/>
+          <p:cNvSpPr txBox="1"/>
+          <p:nvPr/>
+        </p:nvSpPr>
+        <p:spPr>
+          <a:xfrm>
+            <a:off x="2133600" y="533400"/>
+            <a:ext cx="4153638" cy="461665"/>
+          </a:xfrm>
+          <a:prstGeom prst="rect">
+            <a:avLst/>
+          </a:prstGeom>
+          <a:noFill/>
+        </p:spPr>
+        <p:txBody>
+          <a:bodyPr wrap="none" rtlCol="0">
+            <a:spAutoFit/>
+          </a:bodyPr>
+          <a:lstStyle/>
+          <a:p>
+            <a:r>
+              <a:rPr lang="en-US" sz="2400" dirty="0" smtClean="0">
+                <a:latin typeface="Segoe UI Light" pitchFamily="34" charset="0"/>
+                <a:ea typeface="Adobe Myungjo Std M" pitchFamily="18" charset="-128"/>
+              </a:rPr>
+              <a:t>Hi Omri, Welcome to </a:t>
+            </a:r>
+            <a:r>
+              <a:rPr lang="en-US" sz="2400" dirty="0" err="1" smtClean="0">
+                <a:latin typeface="Segoe UI Light" pitchFamily="34" charset="0"/>
+                <a:ea typeface="Adobe Myungjo Std M" pitchFamily="18" charset="-128"/>
+              </a:rPr>
+              <a:t>TwoStep</a:t>
+            </a:r>
+            <a:r>
+              <a:rPr lang="en-US" sz="2400" dirty="0">
+                <a:latin typeface="Segoe UI Light" pitchFamily="34" charset="0"/>
+                <a:ea typeface="Adobe Myungjo Std M" pitchFamily="18" charset="-128"/>
+              </a:rPr>
+              <a:t>!</a:t>
+            </a:r>
+            <a:endParaRPr lang="en-US" sz="2000" dirty="0">
+              <a:latin typeface="Segoe UI Light" pitchFamily="34" charset="0"/>
+              <a:ea typeface="Adobe Myungjo Std M" pitchFamily="18" charset="-128"/>
+            </a:endParaRPr>
+          </a:p>
+        </p:txBody>
+      </p:sp>
+      <p:sp>
+        <p:nvSpPr>
+          <p:cNvPr id="7" name="TextBox 6"/>
+          <p:cNvSpPr txBox="1"/>
+          <p:nvPr/>
+        </p:nvSpPr>
+        <p:spPr>
+          <a:xfrm>
+            <a:off x="2499027" y="990600"/>
+            <a:ext cx="3977974" cy="338554"/>
+          </a:xfrm>
+          <a:prstGeom prst="rect">
+            <a:avLst/>
+          </a:prstGeom>
+          <a:noFill/>
+        </p:spPr>
+        <p:txBody>
+          <a:bodyPr wrap="square" rtlCol="0">
+            <a:spAutoFit/>
+          </a:bodyPr>
+          <a:lstStyle/>
+          <a:p>
+            <a:r>
+              <a:rPr lang="en-US" sz="1600" dirty="0" smtClean="0">
+                <a:latin typeface="Segoe UI Light" pitchFamily="34" charset="0"/>
+                <a:ea typeface="Adobe Myungjo Std M" pitchFamily="18" charset="-128"/>
+              </a:rPr>
+              <a:t>Here’s a short introduction to the product.  </a:t>
+            </a:r>
+          </a:p>
+        </p:txBody>
+      </p:sp>
+      <p:pic>
+        <p:nvPicPr>
+          <p:cNvPr id="1030" name="Picture 6"/>
+          <p:cNvPicPr>
+            <a:picLocks noChangeAspect="1" noChangeArrowheads="1"/>
+          </p:cNvPicPr>
+          <p:nvPr/>
+        </p:nvPicPr>
+        <p:blipFill>
+          <a:blip r:embed="rId3">
+            <a:extLst>
+              <a:ext uri="{28A0092B-C50C-407E-A947-70E740481C1C}">
+                <a14:useLocalDpi xmlns:a14="http://schemas.microsoft.com/office/drawing/2010/main" val="0"/>
+              </a:ext>
+            </a:extLst>
+          </a:blip>
+          <a:stretch>
+            <a:fillRect/>
+          </a:stretch>
+        </p:blipFill>
+        <p:spPr bwMode="auto">
+          <a:xfrm>
+            <a:off x="2514600" y="1295400"/>
+            <a:ext cx="2743200" cy="1955914"/>
+          </a:xfrm>
+          <a:prstGeom prst="rect">
+            <a:avLst/>
+          </a:prstGeom>
+          <a:noFill/>
+          <a:ln>
+            <a:noFill/>
+          </a:ln>
+          <a:effectLst/>
+          <a:extLst>
+            <a:ext uri="{909E8E84-426E-40DD-AFC4-6F175D3DCCD1}">
+              <a14:hiddenFill xmlns:a14="http://schemas.microsoft.com/office/drawing/2010/main">
+                <a:solidFill>
+                  <a:schemeClr val="accent1"/>
+                </a:solidFill>
+              </a14:hiddenFill>
+            </a:ext>
+            <a:ext uri="{91240B29-F687-4F45-9708-019B960494DF}">
+              <a14:hiddenLine xmlns:a14="http://schemas.microsoft.com/office/drawing/2010/main" w="9525">
+                <a:solidFill>
+                  <a:schemeClr val="tx1"/>
+                </a:solidFill>
+                <a:miter lim="800000"/>
+                <a:headEnd/>
+                <a:tailEnd/>
+              </a14:hiddenLine>
+            </a:ext>
+            <a:ext uri="{AF507438-7753-43E0-B8FC-AC1667EBCBE1}">
+              <a14:hiddenEffects xmlns:a14="http://schemas.microsoft.com/office/drawing/2010/main">
+                <a:effectLst>
+                  <a:outerShdw dist="35921" dir="2700000" algn="ctr" rotWithShape="0">
+                    <a:schemeClr val="bg2"/>
+                  </a:outerShdw>
+                </a:effectLst>
+              </a14:hiddenEffects>
+            </a:ext>
+          </a:extLst>
+        </p:spPr>
+      </p:pic>
+      <p:sp>
+        <p:nvSpPr>
+          <p:cNvPr id="2" name="TextBox 1"/>
+          <p:cNvSpPr txBox="1"/>
+          <p:nvPr/>
+        </p:nvSpPr>
+        <p:spPr>
+          <a:xfrm>
+            <a:off x="2514600" y="3239869"/>
+            <a:ext cx="4038599" cy="646331"/>
+          </a:xfrm>
+          <a:prstGeom prst="rect">
+            <a:avLst/>
+          </a:prstGeom>
+          <a:noFill/>
+        </p:spPr>
+        <p:txBody>
+          <a:bodyPr wrap="square" rtlCol="0">
+            <a:spAutoFit/>
+          </a:bodyPr>
+          <a:lstStyle/>
+          <a:p>
+            <a:r>
+              <a:rPr lang="en-US" sz="1200" dirty="0" smtClean="0">
+                <a:latin typeface="Segoe UI Light" pitchFamily="34" charset="0"/>
+                <a:ea typeface="Adobe Myungjo Std M" pitchFamily="18" charset="-128"/>
+              </a:rPr>
+              <a:t>When you are satisfied with the Activity, click the green Run icon on the top-right corner to run the Activity.  To edit the Activity again, click the Pause icon.</a:t>
+            </a:r>
+            <a:endParaRPr lang="en-US" sz="1200" dirty="0">
+              <a:latin typeface="Segoe UI Light" pitchFamily="34" charset="0"/>
+              <a:ea typeface="Adobe Myungjo Std M" pitchFamily="18" charset="-128"/>
+            </a:endParaRPr>
+          </a:p>
+        </p:txBody>
+      </p:sp>
+      <p:sp>
+        <p:nvSpPr>
+          <p:cNvPr id="8" name="TextBox 7"/>
+          <p:cNvSpPr txBox="1"/>
+          <p:nvPr/>
+        </p:nvSpPr>
+        <p:spPr>
+          <a:xfrm>
+            <a:off x="5257800" y="1336541"/>
+            <a:ext cx="1371600" cy="1754326"/>
+          </a:xfrm>
+          <a:prstGeom prst="rect">
+            <a:avLst/>
+          </a:prstGeom>
+          <a:noFill/>
+        </p:spPr>
+        <p:txBody>
+          <a:bodyPr wrap="square" rtlCol="0">
+            <a:spAutoFit/>
+          </a:bodyPr>
+          <a:lstStyle/>
+          <a:p>
+            <a:r>
+              <a:rPr lang="en-US" sz="1200" dirty="0" smtClean="0">
+                <a:latin typeface="Segoe UI Light" pitchFamily="34" charset="0"/>
+                <a:ea typeface="Adobe Myungjo Std M" pitchFamily="18" charset="-128"/>
+              </a:rPr>
+              <a:t>The middle pane of the Dashboard allows you to edit the selected Activity.  You can add, remove, or reorder Steps, and control how the Activity repeats.   </a:t>
+            </a:r>
+            <a:endParaRPr lang="en-US" sz="1200" dirty="0">
+              <a:latin typeface="Segoe UI Light" pitchFamily="34" charset="0"/>
+              <a:ea typeface="Adobe Myungjo Std M" pitchFamily="18" charset="-128"/>
+            </a:endParaRPr>
+          </a:p>
+        </p:txBody>
+      </p:sp>
+    </p:spTree>
+    <p:extLst>
+      <p:ext uri="{BB962C8B-B14F-4D97-AF65-F5344CB8AC3E}">
+        <p14:creationId xmlns:p14="http://schemas.microsoft.com/office/powerpoint/2010/main" val="722753995"/>
+      </p:ext>
+    </p:extLst>
+  </p:cSld>
+  <p:clrMapOvr>
+    <a:masterClrMapping/>
+  </p:clrMapOvr>
+</p:sld>
+</file>
+
+<file path=ppt/slides/slide12.xml><?xml version="1.0" encoding="utf-8"?>
+<p:sld xmlns:a="http://schemas.openxmlformats.org/drawingml/2006/main" xmlns:r="http://schemas.openxmlformats.org/officeDocument/2006/relationships" xmlns:p="http://schemas.openxmlformats.org/presentationml/2006/main">
+  <p:cSld>
+    <p:spTree>
+      <p:nvGrpSpPr>
+        <p:cNvPr id="1" name=""/>
+        <p:cNvGrpSpPr/>
+        <p:nvPr/>
+      </p:nvGrpSpPr>
+      <p:grpSpPr>
+        <a:xfrm>
+          <a:off x="0" y="0"/>
+          <a:ext cx="0" cy="0"/>
+          <a:chOff x="0" y="0"/>
+          <a:chExt cx="0" cy="0"/>
+        </a:xfrm>
+      </p:grpSpPr>
+      <p:pic>
+        <p:nvPicPr>
+          <p:cNvPr id="1029" name="Picture 5"/>
+          <p:cNvPicPr>
+            <a:picLocks noChangeAspect="1" noChangeArrowheads="1"/>
+          </p:cNvPicPr>
+          <p:nvPr/>
+        </p:nvPicPr>
+        <p:blipFill>
+          <a:blip r:embed="rId2">
+            <a:extLst>
+              <a:ext uri="{28A0092B-C50C-407E-A947-70E740481C1C}">
+                <a14:useLocalDpi xmlns:a14="http://schemas.microsoft.com/office/drawing/2010/main" val="0"/>
+              </a:ext>
+            </a:extLst>
+          </a:blip>
+          <a:srcRect/>
+          <a:stretch>
+            <a:fillRect/>
+          </a:stretch>
+        </p:blipFill>
+        <p:spPr bwMode="auto">
+          <a:xfrm>
+            <a:off x="-790575" y="-76200"/>
+            <a:ext cx="10725150" cy="6981826"/>
+          </a:xfrm>
+          <a:prstGeom prst="rect">
+            <a:avLst/>
+          </a:prstGeom>
+          <a:noFill/>
+          <a:ln>
+            <a:noFill/>
+          </a:ln>
+          <a:effectLst/>
+          <a:extLst>
+            <a:ext uri="{909E8E84-426E-40DD-AFC4-6F175D3DCCD1}">
+              <a14:hiddenFill xmlns:a14="http://schemas.microsoft.com/office/drawing/2010/main">
+                <a:solidFill>
+                  <a:schemeClr val="accent1"/>
+                </a:solidFill>
+              </a14:hiddenFill>
+            </a:ext>
+            <a:ext uri="{91240B29-F687-4F45-9708-019B960494DF}">
+              <a14:hiddenLine xmlns:a14="http://schemas.microsoft.com/office/drawing/2010/main" w="9525">
+                <a:solidFill>
+                  <a:schemeClr val="tx1"/>
+                </a:solidFill>
+                <a:miter lim="800000"/>
+                <a:headEnd/>
+                <a:tailEnd/>
+              </a14:hiddenLine>
+            </a:ext>
+            <a:ext uri="{AF507438-7753-43E0-B8FC-AC1667EBCBE1}">
+              <a14:hiddenEffects xmlns:a14="http://schemas.microsoft.com/office/drawing/2010/main">
+                <a:effectLst>
+                  <a:outerShdw dist="35921" dir="2700000" algn="ctr" rotWithShape="0">
+                    <a:schemeClr val="bg2"/>
+                  </a:outerShdw>
+                </a:effectLst>
+              </a14:hiddenEffects>
+            </a:ext>
+          </a:extLst>
+        </p:spPr>
+      </p:pic>
+      <p:sp>
+        <p:nvSpPr>
+          <p:cNvPr id="6" name="TextBox 5"/>
+          <p:cNvSpPr txBox="1"/>
+          <p:nvPr/>
+        </p:nvSpPr>
+        <p:spPr>
+          <a:xfrm>
+            <a:off x="2133600" y="533400"/>
+            <a:ext cx="4153638" cy="461665"/>
+          </a:xfrm>
+          <a:prstGeom prst="rect">
+            <a:avLst/>
+          </a:prstGeom>
+          <a:noFill/>
+        </p:spPr>
+        <p:txBody>
+          <a:bodyPr wrap="none" rtlCol="0">
+            <a:spAutoFit/>
+          </a:bodyPr>
+          <a:lstStyle/>
+          <a:p>
+            <a:r>
+              <a:rPr lang="en-US" sz="2400" dirty="0" smtClean="0">
+                <a:latin typeface="Segoe UI Light" pitchFamily="34" charset="0"/>
+                <a:ea typeface="Adobe Myungjo Std M" pitchFamily="18" charset="-128"/>
+              </a:rPr>
+              <a:t>Hi Omri, Welcome to </a:t>
+            </a:r>
+            <a:r>
+              <a:rPr lang="en-US" sz="2400" dirty="0" err="1" smtClean="0">
+                <a:latin typeface="Segoe UI Light" pitchFamily="34" charset="0"/>
+                <a:ea typeface="Adobe Myungjo Std M" pitchFamily="18" charset="-128"/>
+              </a:rPr>
+              <a:t>TwoStep</a:t>
+            </a:r>
+            <a:r>
+              <a:rPr lang="en-US" sz="2400" dirty="0">
+                <a:latin typeface="Segoe UI Light" pitchFamily="34" charset="0"/>
+                <a:ea typeface="Adobe Myungjo Std M" pitchFamily="18" charset="-128"/>
+              </a:rPr>
+              <a:t>!</a:t>
+            </a:r>
+            <a:endParaRPr lang="en-US" sz="2000" dirty="0">
+              <a:latin typeface="Segoe UI Light" pitchFamily="34" charset="0"/>
+              <a:ea typeface="Adobe Myungjo Std M" pitchFamily="18" charset="-128"/>
+            </a:endParaRPr>
+          </a:p>
+        </p:txBody>
+      </p:sp>
+      <p:sp>
+        <p:nvSpPr>
+          <p:cNvPr id="7" name="TextBox 6"/>
+          <p:cNvSpPr txBox="1"/>
+          <p:nvPr/>
+        </p:nvSpPr>
+        <p:spPr>
+          <a:xfrm>
+            <a:off x="2499027" y="990600"/>
+            <a:ext cx="3977974" cy="338554"/>
+          </a:xfrm>
+          <a:prstGeom prst="rect">
+            <a:avLst/>
+          </a:prstGeom>
+          <a:noFill/>
+        </p:spPr>
+        <p:txBody>
+          <a:bodyPr wrap="square" rtlCol="0">
+            <a:spAutoFit/>
+          </a:bodyPr>
+          <a:lstStyle/>
+          <a:p>
+            <a:r>
+              <a:rPr lang="en-US" sz="1600" dirty="0" smtClean="0">
+                <a:latin typeface="Segoe UI Light" pitchFamily="34" charset="0"/>
+                <a:ea typeface="Adobe Myungjo Std M" pitchFamily="18" charset="-128"/>
+              </a:rPr>
+              <a:t>Here’s a short introduction to the product.  </a:t>
+            </a:r>
+          </a:p>
+        </p:txBody>
+      </p:sp>
+      <p:pic>
+        <p:nvPicPr>
+          <p:cNvPr id="1030" name="Picture 6"/>
+          <p:cNvPicPr>
+            <a:picLocks noChangeAspect="1" noChangeArrowheads="1"/>
+          </p:cNvPicPr>
+          <p:nvPr/>
+        </p:nvPicPr>
+        <p:blipFill>
+          <a:blip r:embed="rId3">
+            <a:extLst>
+              <a:ext uri="{28A0092B-C50C-407E-A947-70E740481C1C}">
+                <a14:useLocalDpi xmlns:a14="http://schemas.microsoft.com/office/drawing/2010/main" val="0"/>
+              </a:ext>
+            </a:extLst>
+          </a:blip>
+          <a:stretch>
+            <a:fillRect/>
+          </a:stretch>
+        </p:blipFill>
+        <p:spPr bwMode="auto">
+          <a:xfrm>
+            <a:off x="2514600" y="1419575"/>
+            <a:ext cx="2743200" cy="1707564"/>
+          </a:xfrm>
+          <a:prstGeom prst="rect">
+            <a:avLst/>
+          </a:prstGeom>
+          <a:noFill/>
+          <a:ln>
+            <a:noFill/>
+          </a:ln>
+          <a:effectLst/>
+          <a:extLst>
+            <a:ext uri="{909E8E84-426E-40DD-AFC4-6F175D3DCCD1}">
+              <a14:hiddenFill xmlns:a14="http://schemas.microsoft.com/office/drawing/2010/main">
+                <a:solidFill>
+                  <a:schemeClr val="accent1"/>
+                </a:solidFill>
+              </a14:hiddenFill>
+            </a:ext>
+            <a:ext uri="{91240B29-F687-4F45-9708-019B960494DF}">
+              <a14:hiddenLine xmlns:a14="http://schemas.microsoft.com/office/drawing/2010/main" w="9525">
+                <a:solidFill>
+                  <a:schemeClr val="tx1"/>
+                </a:solidFill>
+                <a:miter lim="800000"/>
+                <a:headEnd/>
+                <a:tailEnd/>
+              </a14:hiddenLine>
+            </a:ext>
+            <a:ext uri="{AF507438-7753-43E0-B8FC-AC1667EBCBE1}">
+              <a14:hiddenEffects xmlns:a14="http://schemas.microsoft.com/office/drawing/2010/main">
+                <a:effectLst>
+                  <a:outerShdw dist="35921" dir="2700000" algn="ctr" rotWithShape="0">
+                    <a:schemeClr val="bg2"/>
+                  </a:outerShdw>
+                </a:effectLst>
+              </a14:hiddenEffects>
+            </a:ext>
+          </a:extLst>
+        </p:spPr>
+      </p:pic>
+      <p:sp>
+        <p:nvSpPr>
+          <p:cNvPr id="2" name="TextBox 1"/>
+          <p:cNvSpPr txBox="1"/>
+          <p:nvPr/>
+        </p:nvSpPr>
+        <p:spPr>
+          <a:xfrm>
+            <a:off x="2514600" y="3124200"/>
+            <a:ext cx="4038599" cy="830997"/>
+          </a:xfrm>
+          <a:prstGeom prst="rect">
+            <a:avLst/>
+          </a:prstGeom>
+          <a:noFill/>
+        </p:spPr>
+        <p:txBody>
+          <a:bodyPr wrap="square" rtlCol="0">
+            <a:spAutoFit/>
+          </a:bodyPr>
+          <a:lstStyle/>
+          <a:p>
+            <a:r>
+              <a:rPr lang="en-US" sz="1200" dirty="0" smtClean="0">
+                <a:latin typeface="Segoe UI Light" pitchFamily="34" charset="0"/>
+                <a:ea typeface="Adobe Myungjo Std M" pitchFamily="18" charset="-128"/>
+              </a:rPr>
+              <a:t>In addition, </a:t>
+            </a:r>
+            <a:r>
+              <a:rPr lang="en-US" sz="1200" dirty="0" err="1" smtClean="0">
+                <a:latin typeface="Segoe UI Light" pitchFamily="34" charset="0"/>
+                <a:ea typeface="Adobe Myungjo Std M" pitchFamily="18" charset="-128"/>
+              </a:rPr>
+              <a:t>TwoStep</a:t>
+            </a:r>
+            <a:r>
+              <a:rPr lang="en-US" sz="1200" dirty="0" smtClean="0">
+                <a:latin typeface="Segoe UI Light" pitchFamily="34" charset="0"/>
+                <a:ea typeface="Adobe Myungjo Std M" pitchFamily="18" charset="-128"/>
+              </a:rPr>
+              <a:t> recognizes a number of Smart Steps (Find, Call, Add to Calendar, </a:t>
+            </a:r>
+            <a:r>
+              <a:rPr lang="en-US" sz="1200" dirty="0" err="1" smtClean="0">
+                <a:latin typeface="Segoe UI Light" pitchFamily="34" charset="0"/>
+                <a:ea typeface="Adobe Myungjo Std M" pitchFamily="18" charset="-128"/>
+              </a:rPr>
+              <a:t>etc</a:t>
+            </a:r>
+            <a:r>
+              <a:rPr lang="en-US" sz="1200" dirty="0" smtClean="0">
+                <a:latin typeface="Segoe UI Light" pitchFamily="34" charset="0"/>
+                <a:ea typeface="Adobe Myungjo Std M" pitchFamily="18" charset="-128"/>
+              </a:rPr>
+              <a:t>) which can also be changed  explicitly by selecting the Step type.  Each Smart Step has its own Action icon that can help you carry out that Step.  </a:t>
+            </a:r>
+            <a:endParaRPr lang="en-US" sz="1200" dirty="0">
+              <a:latin typeface="Segoe UI Light" pitchFamily="34" charset="0"/>
+              <a:ea typeface="Adobe Myungjo Std M" pitchFamily="18" charset="-128"/>
+            </a:endParaRPr>
+          </a:p>
+        </p:txBody>
+      </p:sp>
+      <p:sp>
+        <p:nvSpPr>
+          <p:cNvPr id="8" name="TextBox 7"/>
+          <p:cNvSpPr txBox="1"/>
+          <p:nvPr/>
+        </p:nvSpPr>
+        <p:spPr>
+          <a:xfrm>
+            <a:off x="5257800" y="1466671"/>
+            <a:ext cx="1295399" cy="1200329"/>
+          </a:xfrm>
+          <a:prstGeom prst="rect">
+            <a:avLst/>
+          </a:prstGeom>
+          <a:noFill/>
+        </p:spPr>
+        <p:txBody>
+          <a:bodyPr wrap="square" rtlCol="0">
+            <a:spAutoFit/>
+          </a:bodyPr>
+          <a:lstStyle/>
+          <a:p>
+            <a:r>
+              <a:rPr lang="en-US" sz="1200" dirty="0" smtClean="0">
+                <a:latin typeface="Segoe UI Light" pitchFamily="34" charset="0"/>
+                <a:ea typeface="Adobe Myungjo Std M" pitchFamily="18" charset="-128"/>
+              </a:rPr>
+              <a:t>In Run mode, the current Step is shown, and you can Defer, Skip, or Complete the Step.  </a:t>
+            </a:r>
+            <a:endParaRPr lang="en-US" sz="1200" dirty="0">
+              <a:latin typeface="Segoe UI Light" pitchFamily="34" charset="0"/>
+              <a:ea typeface="Adobe Myungjo Std M" pitchFamily="18" charset="-128"/>
+            </a:endParaRPr>
+          </a:p>
+        </p:txBody>
+      </p:sp>
+    </p:spTree>
+    <p:extLst>
+      <p:ext uri="{BB962C8B-B14F-4D97-AF65-F5344CB8AC3E}">
+        <p14:creationId xmlns:p14="http://schemas.microsoft.com/office/powerpoint/2010/main" val="2518938966"/>
+      </p:ext>
+    </p:extLst>
+  </p:cSld>
+  <p:clrMapOvr>
+    <a:masterClrMapping/>
+  </p:clrMapOvr>
+</p:sld>
+</file>
+
+<file path=ppt/slides/slide13.xml><?xml version="1.0" encoding="utf-8"?>
+<p:sld xmlns:a="http://schemas.openxmlformats.org/drawingml/2006/main" xmlns:r="http://schemas.openxmlformats.org/officeDocument/2006/relationships" xmlns:p="http://schemas.openxmlformats.org/presentationml/2006/main">
+  <p:cSld>
+    <p:spTree>
+      <p:nvGrpSpPr>
+        <p:cNvPr id="1" name=""/>
+        <p:cNvGrpSpPr/>
+        <p:nvPr/>
+      </p:nvGrpSpPr>
+      <p:grpSpPr>
+        <a:xfrm>
+          <a:off x="0" y="0"/>
+          <a:ext cx="0" cy="0"/>
+          <a:chOff x="0" y="0"/>
+          <a:chExt cx="0" cy="0"/>
+        </a:xfrm>
+      </p:grpSpPr>
+      <p:pic>
+        <p:nvPicPr>
+          <p:cNvPr id="1029" name="Picture 5"/>
+          <p:cNvPicPr>
+            <a:picLocks noChangeAspect="1" noChangeArrowheads="1"/>
+          </p:cNvPicPr>
+          <p:nvPr/>
+        </p:nvPicPr>
+        <p:blipFill>
+          <a:blip r:embed="rId2">
+            <a:extLst>
+              <a:ext uri="{28A0092B-C50C-407E-A947-70E740481C1C}">
+                <a14:useLocalDpi xmlns:a14="http://schemas.microsoft.com/office/drawing/2010/main" val="0"/>
+              </a:ext>
+            </a:extLst>
+          </a:blip>
+          <a:srcRect/>
+          <a:stretch>
+            <a:fillRect/>
+          </a:stretch>
+        </p:blipFill>
+        <p:spPr bwMode="auto">
+          <a:xfrm>
+            <a:off x="-790575" y="-61913"/>
+            <a:ext cx="10725150" cy="6981826"/>
+          </a:xfrm>
+          <a:prstGeom prst="rect">
+            <a:avLst/>
+          </a:prstGeom>
+          <a:noFill/>
+          <a:ln>
+            <a:noFill/>
+          </a:ln>
+          <a:effectLst/>
+          <a:extLst>
+            <a:ext uri="{909E8E84-426E-40DD-AFC4-6F175D3DCCD1}">
+              <a14:hiddenFill xmlns:a14="http://schemas.microsoft.com/office/drawing/2010/main">
+                <a:solidFill>
+                  <a:schemeClr val="accent1"/>
+                </a:solidFill>
+              </a14:hiddenFill>
+            </a:ext>
+            <a:ext uri="{91240B29-F687-4F45-9708-019B960494DF}">
+              <a14:hiddenLine xmlns:a14="http://schemas.microsoft.com/office/drawing/2010/main" w="9525">
+                <a:solidFill>
+                  <a:schemeClr val="tx1"/>
+                </a:solidFill>
+                <a:miter lim="800000"/>
+                <a:headEnd/>
+                <a:tailEnd/>
+              </a14:hiddenLine>
+            </a:ext>
+            <a:ext uri="{AF507438-7753-43E0-B8FC-AC1667EBCBE1}">
+              <a14:hiddenEffects xmlns:a14="http://schemas.microsoft.com/office/drawing/2010/main">
+                <a:effectLst>
+                  <a:outerShdw dist="35921" dir="2700000" algn="ctr" rotWithShape="0">
+                    <a:schemeClr val="bg2"/>
+                  </a:outerShdw>
+                </a:effectLst>
+              </a14:hiddenEffects>
+            </a:ext>
+          </a:extLst>
+        </p:spPr>
+      </p:pic>
+      <p:sp>
+        <p:nvSpPr>
+          <p:cNvPr id="6" name="TextBox 5"/>
+          <p:cNvSpPr txBox="1"/>
+          <p:nvPr/>
+        </p:nvSpPr>
+        <p:spPr>
+          <a:xfrm>
+            <a:off x="2133600" y="533400"/>
+            <a:ext cx="4153638" cy="461665"/>
+          </a:xfrm>
+          <a:prstGeom prst="rect">
+            <a:avLst/>
+          </a:prstGeom>
+          <a:noFill/>
+        </p:spPr>
+        <p:txBody>
+          <a:bodyPr wrap="none" rtlCol="0">
+            <a:spAutoFit/>
+          </a:bodyPr>
+          <a:lstStyle/>
+          <a:p>
+            <a:r>
+              <a:rPr lang="en-US" sz="2400" dirty="0" smtClean="0">
+                <a:latin typeface="Segoe UI Light" pitchFamily="34" charset="0"/>
+                <a:ea typeface="Adobe Myungjo Std M" pitchFamily="18" charset="-128"/>
+              </a:rPr>
+              <a:t>Hi Omri, Welcome to </a:t>
+            </a:r>
+            <a:r>
+              <a:rPr lang="en-US" sz="2400" dirty="0" err="1" smtClean="0">
+                <a:latin typeface="Segoe UI Light" pitchFamily="34" charset="0"/>
+                <a:ea typeface="Adobe Myungjo Std M" pitchFamily="18" charset="-128"/>
+              </a:rPr>
+              <a:t>TwoStep</a:t>
+            </a:r>
+            <a:r>
+              <a:rPr lang="en-US" sz="2400" dirty="0">
+                <a:latin typeface="Segoe UI Light" pitchFamily="34" charset="0"/>
+                <a:ea typeface="Adobe Myungjo Std M" pitchFamily="18" charset="-128"/>
+              </a:rPr>
+              <a:t>!</a:t>
+            </a:r>
+            <a:endParaRPr lang="en-US" sz="2000" dirty="0">
+              <a:latin typeface="Segoe UI Light" pitchFamily="34" charset="0"/>
+              <a:ea typeface="Adobe Myungjo Std M" pitchFamily="18" charset="-128"/>
+            </a:endParaRPr>
+          </a:p>
+        </p:txBody>
+      </p:sp>
+      <p:sp>
+        <p:nvSpPr>
+          <p:cNvPr id="7" name="TextBox 6"/>
+          <p:cNvSpPr txBox="1"/>
+          <p:nvPr/>
+        </p:nvSpPr>
+        <p:spPr>
+          <a:xfrm>
+            <a:off x="2499027" y="990600"/>
+            <a:ext cx="3977974" cy="338554"/>
+          </a:xfrm>
+          <a:prstGeom prst="rect">
+            <a:avLst/>
+          </a:prstGeom>
+          <a:noFill/>
+        </p:spPr>
+        <p:txBody>
+          <a:bodyPr wrap="square" rtlCol="0">
+            <a:spAutoFit/>
+          </a:bodyPr>
+          <a:lstStyle/>
+          <a:p>
+            <a:r>
+              <a:rPr lang="en-US" sz="1600" dirty="0" smtClean="0">
+                <a:latin typeface="Segoe UI Light" pitchFamily="34" charset="0"/>
+                <a:ea typeface="Adobe Myungjo Std M" pitchFamily="18" charset="-128"/>
+              </a:rPr>
+              <a:t>Here’s a short introduction to the product.  </a:t>
+            </a:r>
+          </a:p>
+        </p:txBody>
+      </p:sp>
+      <p:pic>
+        <p:nvPicPr>
+          <p:cNvPr id="1030" name="Picture 6"/>
+          <p:cNvPicPr>
+            <a:picLocks noChangeAspect="1" noChangeArrowheads="1"/>
+          </p:cNvPicPr>
+          <p:nvPr/>
+        </p:nvPicPr>
+        <p:blipFill>
+          <a:blip r:embed="rId3">
+            <a:extLst>
+              <a:ext uri="{28A0092B-C50C-407E-A947-70E740481C1C}">
+                <a14:useLocalDpi xmlns:a14="http://schemas.microsoft.com/office/drawing/2010/main" val="0"/>
+              </a:ext>
+            </a:extLst>
+          </a:blip>
+          <a:stretch>
+            <a:fillRect/>
+          </a:stretch>
+        </p:blipFill>
+        <p:spPr bwMode="auto">
+          <a:xfrm>
+            <a:off x="2612602" y="1416636"/>
+            <a:ext cx="1845394" cy="1707564"/>
+          </a:xfrm>
+          <a:prstGeom prst="rect">
+            <a:avLst/>
+          </a:prstGeom>
+          <a:noFill/>
+          <a:ln>
+            <a:noFill/>
+          </a:ln>
+          <a:effectLst/>
+          <a:extLst>
+            <a:ext uri="{909E8E84-426E-40DD-AFC4-6F175D3DCCD1}">
+              <a14:hiddenFill xmlns:a14="http://schemas.microsoft.com/office/drawing/2010/main">
+                <a:solidFill>
+                  <a:schemeClr val="accent1"/>
+                </a:solidFill>
+              </a14:hiddenFill>
+            </a:ext>
+            <a:ext uri="{91240B29-F687-4F45-9708-019B960494DF}">
+              <a14:hiddenLine xmlns:a14="http://schemas.microsoft.com/office/drawing/2010/main" w="9525">
+                <a:solidFill>
+                  <a:schemeClr val="tx1"/>
+                </a:solidFill>
+                <a:miter lim="800000"/>
+                <a:headEnd/>
+                <a:tailEnd/>
+              </a14:hiddenLine>
+            </a:ext>
+            <a:ext uri="{AF507438-7753-43E0-B8FC-AC1667EBCBE1}">
+              <a14:hiddenEffects xmlns:a14="http://schemas.microsoft.com/office/drawing/2010/main">
+                <a:effectLst>
+                  <a:outerShdw dist="35921" dir="2700000" algn="ctr" rotWithShape="0">
+                    <a:schemeClr val="bg2"/>
+                  </a:outerShdw>
+                </a:effectLst>
+              </a14:hiddenEffects>
+            </a:ext>
+          </a:extLst>
+        </p:spPr>
+      </p:pic>
+      <p:sp>
+        <p:nvSpPr>
+          <p:cNvPr id="2" name="TextBox 1"/>
+          <p:cNvSpPr txBox="1"/>
+          <p:nvPr/>
+        </p:nvSpPr>
+        <p:spPr>
+          <a:xfrm>
+            <a:off x="2514600" y="3124200"/>
+            <a:ext cx="4038599" cy="830997"/>
+          </a:xfrm>
+          <a:prstGeom prst="rect">
+            <a:avLst/>
+          </a:prstGeom>
+          <a:noFill/>
+        </p:spPr>
+        <p:txBody>
+          <a:bodyPr wrap="square" rtlCol="0">
+            <a:spAutoFit/>
+          </a:bodyPr>
+          <a:lstStyle/>
+          <a:p>
+            <a:r>
+              <a:rPr lang="en-US" sz="1200" dirty="0" smtClean="0">
+                <a:latin typeface="Segoe UI Light" pitchFamily="34" charset="0"/>
+                <a:ea typeface="Adobe Myungjo Std M" pitchFamily="18" charset="-128"/>
+              </a:rPr>
+              <a:t>Smart Steps work better when </a:t>
+            </a:r>
+            <a:r>
+              <a:rPr lang="en-US" sz="1200" dirty="0" err="1" smtClean="0">
+                <a:latin typeface="Segoe UI Light" pitchFamily="34" charset="0"/>
+                <a:ea typeface="Adobe Myungjo Std M" pitchFamily="18" charset="-128"/>
+              </a:rPr>
+              <a:t>TwoStep</a:t>
+            </a:r>
+            <a:r>
+              <a:rPr lang="en-US" sz="1200" dirty="0" smtClean="0">
+                <a:latin typeface="Segoe UI Light" pitchFamily="34" charset="0"/>
+                <a:ea typeface="Adobe Myungjo Std M" pitchFamily="18" charset="-128"/>
+              </a:rPr>
+              <a:t> is connected to Facebook and Google: Contacts are auto-completed from Facebook, and the “Add to Calendar” Smart Step only works if you connected to Google.</a:t>
+            </a:r>
+            <a:endParaRPr lang="en-US" sz="1200" dirty="0">
+              <a:latin typeface="Segoe UI Light" pitchFamily="34" charset="0"/>
+              <a:ea typeface="Adobe Myungjo Std M" pitchFamily="18" charset="-128"/>
+            </a:endParaRPr>
+          </a:p>
+        </p:txBody>
+      </p:sp>
+      <p:sp>
+        <p:nvSpPr>
+          <p:cNvPr id="8" name="TextBox 7"/>
+          <p:cNvSpPr txBox="1"/>
+          <p:nvPr/>
+        </p:nvSpPr>
+        <p:spPr>
+          <a:xfrm>
+            <a:off x="4608945" y="1416636"/>
+            <a:ext cx="1868056" cy="1569660"/>
+          </a:xfrm>
+          <a:prstGeom prst="rect">
+            <a:avLst/>
+          </a:prstGeom>
+          <a:noFill/>
+        </p:spPr>
+        <p:txBody>
+          <a:bodyPr wrap="square" rtlCol="0">
+            <a:spAutoFit/>
+          </a:bodyPr>
+          <a:lstStyle/>
+          <a:p>
+            <a:r>
+              <a:rPr lang="en-US" sz="1200" dirty="0" smtClean="0">
+                <a:latin typeface="Segoe UI Light" pitchFamily="34" charset="0"/>
+                <a:ea typeface="Adobe Myungjo Std M" pitchFamily="18" charset="-128"/>
+              </a:rPr>
+              <a:t>If a Smart Step requires more information (for example, a Call Step needs a phone number), a dialog box will prompt for a location or contact and try to obtain the phone number automatically.</a:t>
+            </a:r>
+            <a:endParaRPr lang="en-US" sz="1200" dirty="0">
+              <a:latin typeface="Segoe UI Light" pitchFamily="34" charset="0"/>
+              <a:ea typeface="Adobe Myungjo Std M" pitchFamily="18" charset="-128"/>
+            </a:endParaRPr>
+          </a:p>
+        </p:txBody>
+      </p:sp>
+    </p:spTree>
+    <p:extLst>
+      <p:ext uri="{BB962C8B-B14F-4D97-AF65-F5344CB8AC3E}">
+        <p14:creationId xmlns:p14="http://schemas.microsoft.com/office/powerpoint/2010/main" val="663193968"/>
+      </p:ext>
+    </p:extLst>
+  </p:cSld>
+  <p:clrMapOvr>
+    <a:masterClrMapping/>
+  </p:clrMapOvr>
+</p:sld>
+</file>
+
+<file path=ppt/slides/slide14.xml><?xml version="1.0" encoding="utf-8"?>
+<p:sld xmlns:a="http://schemas.openxmlformats.org/drawingml/2006/main" xmlns:r="http://schemas.openxmlformats.org/officeDocument/2006/relationships" xmlns:p="http://schemas.openxmlformats.org/presentationml/2006/main">
+  <p:cSld>
+    <p:spTree>
+      <p:nvGrpSpPr>
+        <p:cNvPr id="1" name=""/>
+        <p:cNvGrpSpPr/>
+        <p:nvPr/>
+      </p:nvGrpSpPr>
+      <p:grpSpPr>
+        <a:xfrm>
+          <a:off x="0" y="0"/>
+          <a:ext cx="0" cy="0"/>
+          <a:chOff x="0" y="0"/>
+          <a:chExt cx="0" cy="0"/>
+        </a:xfrm>
+      </p:grpSpPr>
+      <p:pic>
+        <p:nvPicPr>
+          <p:cNvPr id="1029" name="Picture 5"/>
+          <p:cNvPicPr>
+            <a:picLocks noChangeAspect="1" noChangeArrowheads="1"/>
+          </p:cNvPicPr>
+          <p:nvPr/>
+        </p:nvPicPr>
+        <p:blipFill>
+          <a:blip r:embed="rId2">
+            <a:extLst>
+              <a:ext uri="{28A0092B-C50C-407E-A947-70E740481C1C}">
+                <a14:useLocalDpi xmlns:a14="http://schemas.microsoft.com/office/drawing/2010/main" val="0"/>
+              </a:ext>
+            </a:extLst>
+          </a:blip>
+          <a:srcRect/>
+          <a:stretch>
+            <a:fillRect/>
+          </a:stretch>
+        </p:blipFill>
+        <p:spPr bwMode="auto">
+          <a:xfrm>
+            <a:off x="-790575" y="-61913"/>
+            <a:ext cx="10725150" cy="6981826"/>
+          </a:xfrm>
+          <a:prstGeom prst="rect">
+            <a:avLst/>
+          </a:prstGeom>
+          <a:noFill/>
+          <a:ln>
+            <a:noFill/>
+          </a:ln>
+          <a:effectLst/>
+          <a:extLst>
+            <a:ext uri="{909E8E84-426E-40DD-AFC4-6F175D3DCCD1}">
+              <a14:hiddenFill xmlns:a14="http://schemas.microsoft.com/office/drawing/2010/main">
+                <a:solidFill>
+                  <a:schemeClr val="accent1"/>
+                </a:solidFill>
+              </a14:hiddenFill>
+            </a:ext>
+            <a:ext uri="{91240B29-F687-4F45-9708-019B960494DF}">
+              <a14:hiddenLine xmlns:a14="http://schemas.microsoft.com/office/drawing/2010/main" w="9525">
+                <a:solidFill>
+                  <a:schemeClr val="tx1"/>
+                </a:solidFill>
+                <a:miter lim="800000"/>
+                <a:headEnd/>
+                <a:tailEnd/>
+              </a14:hiddenLine>
+            </a:ext>
+            <a:ext uri="{AF507438-7753-43E0-B8FC-AC1667EBCBE1}">
+              <a14:hiddenEffects xmlns:a14="http://schemas.microsoft.com/office/drawing/2010/main">
+                <a:effectLst>
+                  <a:outerShdw dist="35921" dir="2700000" algn="ctr" rotWithShape="0">
+                    <a:schemeClr val="bg2"/>
+                  </a:outerShdw>
+                </a:effectLst>
+              </a14:hiddenEffects>
+            </a:ext>
+          </a:extLst>
+        </p:spPr>
+      </p:pic>
+      <p:sp>
+        <p:nvSpPr>
+          <p:cNvPr id="6" name="TextBox 5"/>
+          <p:cNvSpPr txBox="1"/>
+          <p:nvPr/>
+        </p:nvSpPr>
+        <p:spPr>
+          <a:xfrm>
+            <a:off x="2133600" y="533400"/>
+            <a:ext cx="4153638" cy="461665"/>
+          </a:xfrm>
+          <a:prstGeom prst="rect">
+            <a:avLst/>
+          </a:prstGeom>
+          <a:noFill/>
+        </p:spPr>
+        <p:txBody>
+          <a:bodyPr wrap="none" rtlCol="0">
+            <a:spAutoFit/>
+          </a:bodyPr>
+          <a:lstStyle/>
+          <a:p>
+            <a:r>
+              <a:rPr lang="en-US" sz="2400" dirty="0" smtClean="0">
+                <a:latin typeface="Segoe UI Light" pitchFamily="34" charset="0"/>
+                <a:ea typeface="Adobe Myungjo Std M" pitchFamily="18" charset="-128"/>
+              </a:rPr>
+              <a:t>Hi Omri, Welcome to </a:t>
+            </a:r>
+            <a:r>
+              <a:rPr lang="en-US" sz="2400" dirty="0" err="1" smtClean="0">
+                <a:latin typeface="Segoe UI Light" pitchFamily="34" charset="0"/>
+                <a:ea typeface="Adobe Myungjo Std M" pitchFamily="18" charset="-128"/>
+              </a:rPr>
+              <a:t>TwoStep</a:t>
+            </a:r>
+            <a:r>
+              <a:rPr lang="en-US" sz="2400" dirty="0">
+                <a:latin typeface="Segoe UI Light" pitchFamily="34" charset="0"/>
+                <a:ea typeface="Adobe Myungjo Std M" pitchFamily="18" charset="-128"/>
+              </a:rPr>
+              <a:t>!</a:t>
+            </a:r>
+            <a:endParaRPr lang="en-US" sz="2000" dirty="0">
+              <a:latin typeface="Segoe UI Light" pitchFamily="34" charset="0"/>
+              <a:ea typeface="Adobe Myungjo Std M" pitchFamily="18" charset="-128"/>
+            </a:endParaRPr>
+          </a:p>
+        </p:txBody>
+      </p:sp>
+      <p:sp>
+        <p:nvSpPr>
+          <p:cNvPr id="7" name="TextBox 6"/>
+          <p:cNvSpPr txBox="1"/>
+          <p:nvPr/>
+        </p:nvSpPr>
+        <p:spPr>
+          <a:xfrm>
+            <a:off x="2499027" y="990600"/>
+            <a:ext cx="3977974" cy="338554"/>
+          </a:xfrm>
+          <a:prstGeom prst="rect">
+            <a:avLst/>
+          </a:prstGeom>
+          <a:noFill/>
+        </p:spPr>
+        <p:txBody>
+          <a:bodyPr wrap="square" rtlCol="0">
+            <a:spAutoFit/>
+          </a:bodyPr>
+          <a:lstStyle/>
+          <a:p>
+            <a:r>
+              <a:rPr lang="en-US" sz="1600" dirty="0" smtClean="0">
+                <a:latin typeface="Segoe UI Light" pitchFamily="34" charset="0"/>
+                <a:ea typeface="Adobe Myungjo Std M" pitchFamily="18" charset="-128"/>
+              </a:rPr>
+              <a:t>Here’s a short introduction to the product.  </a:t>
+            </a:r>
+          </a:p>
+        </p:txBody>
+      </p:sp>
+      <p:sp>
+        <p:nvSpPr>
+          <p:cNvPr id="2" name="TextBox 1"/>
+          <p:cNvSpPr txBox="1"/>
+          <p:nvPr/>
+        </p:nvSpPr>
+        <p:spPr>
+          <a:xfrm>
+            <a:off x="2590800" y="2794337"/>
+            <a:ext cx="3810001" cy="1015663"/>
+          </a:xfrm>
+          <a:prstGeom prst="rect">
+            <a:avLst/>
+          </a:prstGeom>
+          <a:noFill/>
+        </p:spPr>
+        <p:txBody>
+          <a:bodyPr wrap="square" rtlCol="0">
+            <a:spAutoFit/>
+          </a:bodyPr>
+          <a:lstStyle/>
+          <a:p>
+            <a:r>
+              <a:rPr lang="en-US" sz="1200" dirty="0" err="1" smtClean="0">
+                <a:latin typeface="Segoe UI Light" pitchFamily="34" charset="0"/>
+                <a:ea typeface="Adobe Myungjo Std M" pitchFamily="18" charset="-128"/>
+              </a:rPr>
+              <a:t>TwoStep’s</a:t>
+            </a:r>
+            <a:r>
+              <a:rPr lang="en-US" sz="1200" dirty="0" smtClean="0">
+                <a:latin typeface="Segoe UI Light" pitchFamily="34" charset="0"/>
+                <a:ea typeface="Adobe Myungjo Std M" pitchFamily="18" charset="-128"/>
+              </a:rPr>
+              <a:t> other main view is the Next Steps view.  This view presents all your immediate next steps across all Activities, sorted by due date.  It also allows filtering the Steps by Step Type (all phone calls), and carrying out the Step by clicking its Action icon.</a:t>
+            </a:r>
+            <a:endParaRPr lang="en-US" sz="1200" dirty="0">
+              <a:latin typeface="Segoe UI Light" pitchFamily="34" charset="0"/>
+              <a:ea typeface="Adobe Myungjo Std M" pitchFamily="18" charset="-128"/>
+            </a:endParaRPr>
+          </a:p>
+        </p:txBody>
+      </p:sp>
+      <p:pic>
+        <p:nvPicPr>
+          <p:cNvPr id="2050" name="Picture 2"/>
+          <p:cNvPicPr>
+            <a:picLocks noChangeAspect="1" noChangeArrowheads="1"/>
+          </p:cNvPicPr>
+          <p:nvPr/>
+        </p:nvPicPr>
+        <p:blipFill>
+          <a:blip r:embed="rId3">
+            <a:extLst>
+              <a:ext uri="{28A0092B-C50C-407E-A947-70E740481C1C}">
+                <a14:useLocalDpi xmlns:a14="http://schemas.microsoft.com/office/drawing/2010/main" val="0"/>
+              </a:ext>
+            </a:extLst>
+          </a:blip>
+          <a:srcRect/>
+          <a:stretch>
+            <a:fillRect/>
+          </a:stretch>
+        </p:blipFill>
+        <p:spPr bwMode="auto">
+          <a:xfrm>
+            <a:off x="2583311" y="1388017"/>
+            <a:ext cx="3893690" cy="1334551"/>
+          </a:xfrm>
+          <a:prstGeom prst="rect">
+            <a:avLst/>
+          </a:prstGeom>
+          <a:noFill/>
+          <a:ln>
+            <a:noFill/>
+          </a:ln>
+          <a:effectLst/>
+          <a:extLst>
+            <a:ext uri="{909E8E84-426E-40DD-AFC4-6F175D3DCCD1}">
+              <a14:hiddenFill xmlns:a14="http://schemas.microsoft.com/office/drawing/2010/main">
+                <a:solidFill>
+                  <a:schemeClr val="accent1"/>
+                </a:solidFill>
+              </a14:hiddenFill>
+            </a:ext>
+            <a:ext uri="{91240B29-F687-4F45-9708-019B960494DF}">
+              <a14:hiddenLine xmlns:a14="http://schemas.microsoft.com/office/drawing/2010/main" w="9525">
+                <a:solidFill>
+                  <a:schemeClr val="tx1"/>
+                </a:solidFill>
+                <a:miter lim="800000"/>
+                <a:headEnd/>
+                <a:tailEnd/>
+              </a14:hiddenLine>
+            </a:ext>
+            <a:ext uri="{AF507438-7753-43E0-B8FC-AC1667EBCBE1}">
+              <a14:hiddenEffects xmlns:a14="http://schemas.microsoft.com/office/drawing/2010/main">
+                <a:effectLst>
+                  <a:outerShdw dist="35921" dir="2700000" algn="ctr" rotWithShape="0">
+                    <a:schemeClr val="bg2"/>
+                  </a:outerShdw>
+                </a:effectLst>
+              </a14:hiddenEffects>
+            </a:ext>
+          </a:extLst>
+        </p:spPr>
+      </p:pic>
+    </p:spTree>
+    <p:extLst>
+      <p:ext uri="{BB962C8B-B14F-4D97-AF65-F5344CB8AC3E}">
+        <p14:creationId xmlns:p14="http://schemas.microsoft.com/office/powerpoint/2010/main" val="3804995848"/>
+      </p:ext>
+    </p:extLst>
+  </p:cSld>
+  <p:clrMapOvr>
+    <a:masterClrMapping/>
+  </p:clrMapOvr>
+</p:sld>
+</file>
+
+<file path=ppt/slides/slide15.xml><?xml version="1.0" encoding="utf-8"?>
+<p:sld xmlns:a="http://schemas.openxmlformats.org/drawingml/2006/main" xmlns:r="http://schemas.openxmlformats.org/officeDocument/2006/relationships" xmlns:p="http://schemas.openxmlformats.org/presentationml/2006/main">
+  <p:cSld>
+    <p:spTree>
+      <p:nvGrpSpPr>
+        <p:cNvPr id="1" name=""/>
+        <p:cNvGrpSpPr/>
+        <p:nvPr/>
+      </p:nvGrpSpPr>
+      <p:grpSpPr>
+        <a:xfrm>
+          <a:off x="0" y="0"/>
+          <a:ext cx="0" cy="0"/>
+          <a:chOff x="0" y="0"/>
+          <a:chExt cx="0" cy="0"/>
+        </a:xfrm>
+      </p:grpSpPr>
+      <p:pic>
+        <p:nvPicPr>
+          <p:cNvPr id="1029" name="Picture 5"/>
+          <p:cNvPicPr>
+            <a:picLocks noChangeAspect="1" noChangeArrowheads="1"/>
+          </p:cNvPicPr>
+          <p:nvPr/>
+        </p:nvPicPr>
+        <p:blipFill>
+          <a:blip r:embed="rId2">
+            <a:extLst>
+              <a:ext uri="{28A0092B-C50C-407E-A947-70E740481C1C}">
+                <a14:useLocalDpi xmlns:a14="http://schemas.microsoft.com/office/drawing/2010/main" val="0"/>
+              </a:ext>
+            </a:extLst>
+          </a:blip>
+          <a:srcRect/>
+          <a:stretch>
+            <a:fillRect/>
+          </a:stretch>
+        </p:blipFill>
+        <p:spPr bwMode="auto">
+          <a:xfrm>
+            <a:off x="-790575" y="-61913"/>
+            <a:ext cx="10725150" cy="6981826"/>
+          </a:xfrm>
+          <a:prstGeom prst="rect">
+            <a:avLst/>
+          </a:prstGeom>
+          <a:noFill/>
+          <a:ln>
+            <a:noFill/>
+          </a:ln>
+          <a:effectLst/>
+          <a:extLst>
+            <a:ext uri="{909E8E84-426E-40DD-AFC4-6F175D3DCCD1}">
+              <a14:hiddenFill xmlns:a14="http://schemas.microsoft.com/office/drawing/2010/main">
+                <a:solidFill>
+                  <a:schemeClr val="accent1"/>
+                </a:solidFill>
+              </a14:hiddenFill>
+            </a:ext>
+            <a:ext uri="{91240B29-F687-4F45-9708-019B960494DF}">
+              <a14:hiddenLine xmlns:a14="http://schemas.microsoft.com/office/drawing/2010/main" w="9525">
+                <a:solidFill>
+                  <a:schemeClr val="tx1"/>
+                </a:solidFill>
+                <a:miter lim="800000"/>
+                <a:headEnd/>
+                <a:tailEnd/>
+              </a14:hiddenLine>
+            </a:ext>
+            <a:ext uri="{AF507438-7753-43E0-B8FC-AC1667EBCBE1}">
+              <a14:hiddenEffects xmlns:a14="http://schemas.microsoft.com/office/drawing/2010/main">
+                <a:effectLst>
+                  <a:outerShdw dist="35921" dir="2700000" algn="ctr" rotWithShape="0">
+                    <a:schemeClr val="bg2"/>
+                  </a:outerShdw>
+                </a:effectLst>
+              </a14:hiddenEffects>
+            </a:ext>
+          </a:extLst>
+        </p:spPr>
+      </p:pic>
+      <p:sp>
+        <p:nvSpPr>
+          <p:cNvPr id="6" name="TextBox 5"/>
+          <p:cNvSpPr txBox="1"/>
+          <p:nvPr/>
+        </p:nvSpPr>
+        <p:spPr>
+          <a:xfrm>
+            <a:off x="2133600" y="533400"/>
+            <a:ext cx="4153638" cy="461665"/>
+          </a:xfrm>
+          <a:prstGeom prst="rect">
+            <a:avLst/>
+          </a:prstGeom>
+          <a:noFill/>
+        </p:spPr>
+        <p:txBody>
+          <a:bodyPr wrap="none" rtlCol="0">
+            <a:spAutoFit/>
+          </a:bodyPr>
+          <a:lstStyle/>
+          <a:p>
+            <a:r>
+              <a:rPr lang="en-US" sz="2400" dirty="0" smtClean="0">
+                <a:latin typeface="Segoe UI Light" pitchFamily="34" charset="0"/>
+                <a:ea typeface="Adobe Myungjo Std M" pitchFamily="18" charset="-128"/>
+              </a:rPr>
+              <a:t>Hi Omri, Welcome to </a:t>
+            </a:r>
+            <a:r>
+              <a:rPr lang="en-US" sz="2400" dirty="0" err="1" smtClean="0">
+                <a:latin typeface="Segoe UI Light" pitchFamily="34" charset="0"/>
+                <a:ea typeface="Adobe Myungjo Std M" pitchFamily="18" charset="-128"/>
+              </a:rPr>
+              <a:t>TwoStep</a:t>
+            </a:r>
+            <a:r>
+              <a:rPr lang="en-US" sz="2400" dirty="0">
+                <a:latin typeface="Segoe UI Light" pitchFamily="34" charset="0"/>
+                <a:ea typeface="Adobe Myungjo Std M" pitchFamily="18" charset="-128"/>
+              </a:rPr>
+              <a:t>!</a:t>
+            </a:r>
+            <a:endParaRPr lang="en-US" sz="2000" dirty="0">
+              <a:latin typeface="Segoe UI Light" pitchFamily="34" charset="0"/>
+              <a:ea typeface="Adobe Myungjo Std M" pitchFamily="18" charset="-128"/>
+            </a:endParaRPr>
+          </a:p>
+        </p:txBody>
+      </p:sp>
+      <p:sp>
+        <p:nvSpPr>
+          <p:cNvPr id="7" name="TextBox 6"/>
+          <p:cNvSpPr txBox="1"/>
+          <p:nvPr/>
+        </p:nvSpPr>
+        <p:spPr>
+          <a:xfrm>
+            <a:off x="2499027" y="990600"/>
+            <a:ext cx="3977974" cy="338554"/>
+          </a:xfrm>
+          <a:prstGeom prst="rect">
+            <a:avLst/>
+          </a:prstGeom>
+          <a:noFill/>
+        </p:spPr>
+        <p:txBody>
+          <a:bodyPr wrap="square" rtlCol="0">
+            <a:spAutoFit/>
+          </a:bodyPr>
+          <a:lstStyle/>
+          <a:p>
+            <a:r>
+              <a:rPr lang="en-US" sz="1600" dirty="0" smtClean="0">
+                <a:latin typeface="Segoe UI Light" pitchFamily="34" charset="0"/>
+                <a:ea typeface="Adobe Myungjo Std M" pitchFamily="18" charset="-128"/>
+              </a:rPr>
+              <a:t>Here’s a short introduction to the product.  </a:t>
+            </a:r>
+          </a:p>
+        </p:txBody>
+      </p:sp>
+      <p:pic>
+        <p:nvPicPr>
+          <p:cNvPr id="1030" name="Picture 6"/>
+          <p:cNvPicPr>
+            <a:picLocks noChangeAspect="1" noChangeArrowheads="1"/>
+          </p:cNvPicPr>
+          <p:nvPr/>
+        </p:nvPicPr>
+        <p:blipFill>
+          <a:blip r:embed="rId3" cstate="print">
+            <a:extLst>
+              <a:ext uri="{28A0092B-C50C-407E-A947-70E740481C1C}">
+                <a14:useLocalDpi xmlns:a14="http://schemas.microsoft.com/office/drawing/2010/main" val="0"/>
+              </a:ext>
+            </a:extLst>
+          </a:blip>
+          <a:stretch>
+            <a:fillRect/>
+          </a:stretch>
+        </p:blipFill>
+        <p:spPr bwMode="auto">
+          <a:xfrm>
+            <a:off x="2568011" y="1308372"/>
+            <a:ext cx="1318189" cy="2538476"/>
+          </a:xfrm>
+          <a:prstGeom prst="rect">
+            <a:avLst/>
+          </a:prstGeom>
+          <a:noFill/>
+          <a:ln>
+            <a:noFill/>
+          </a:ln>
+          <a:effectLst/>
+          <a:extLst>
+            <a:ext uri="{909E8E84-426E-40DD-AFC4-6F175D3DCCD1}">
+              <a14:hiddenFill xmlns:a14="http://schemas.microsoft.com/office/drawing/2010/main">
+                <a:solidFill>
+                  <a:schemeClr val="accent1"/>
+                </a:solidFill>
+              </a14:hiddenFill>
+            </a:ext>
+            <a:ext uri="{91240B29-F687-4F45-9708-019B960494DF}">
+              <a14:hiddenLine xmlns:a14="http://schemas.microsoft.com/office/drawing/2010/main" w="9525">
+                <a:solidFill>
+                  <a:schemeClr val="tx1"/>
+                </a:solidFill>
+                <a:miter lim="800000"/>
+                <a:headEnd/>
+                <a:tailEnd/>
+              </a14:hiddenLine>
+            </a:ext>
+            <a:ext uri="{AF507438-7753-43E0-B8FC-AC1667EBCBE1}">
+              <a14:hiddenEffects xmlns:a14="http://schemas.microsoft.com/office/drawing/2010/main">
+                <a:effectLst>
+                  <a:outerShdw dist="35921" dir="2700000" algn="ctr" rotWithShape="0">
+                    <a:schemeClr val="bg2"/>
+                  </a:outerShdw>
+                </a:effectLst>
+              </a14:hiddenEffects>
+            </a:ext>
+          </a:extLst>
+        </p:spPr>
+      </p:pic>
+      <p:sp>
+        <p:nvSpPr>
+          <p:cNvPr id="2" name="TextBox 1"/>
+          <p:cNvSpPr txBox="1"/>
+          <p:nvPr/>
+        </p:nvSpPr>
+        <p:spPr>
+          <a:xfrm>
+            <a:off x="3962400" y="1447800"/>
+            <a:ext cx="2438400" cy="2308324"/>
+          </a:xfrm>
+          <a:prstGeom prst="rect">
+            <a:avLst/>
+          </a:prstGeom>
+          <a:noFill/>
+        </p:spPr>
+        <p:txBody>
+          <a:bodyPr wrap="square" rtlCol="0">
+            <a:spAutoFit/>
+          </a:bodyPr>
+          <a:lstStyle/>
+          <a:p>
+            <a:r>
+              <a:rPr lang="en-US" sz="1200" dirty="0" smtClean="0">
+                <a:latin typeface="Segoe UI Light" pitchFamily="34" charset="0"/>
+                <a:ea typeface="Adobe Myungjo Std M" pitchFamily="18" charset="-128"/>
+              </a:rPr>
+              <a:t>Finally, </a:t>
+            </a:r>
+            <a:r>
+              <a:rPr lang="en-US" sz="1200" dirty="0" err="1" smtClean="0">
+                <a:latin typeface="Segoe UI Light" pitchFamily="34" charset="0"/>
+                <a:ea typeface="Adobe Myungjo Std M" pitchFamily="18" charset="-128"/>
+              </a:rPr>
+              <a:t>TwoStep’s</a:t>
+            </a:r>
+            <a:r>
+              <a:rPr lang="en-US" sz="1200" dirty="0" smtClean="0">
+                <a:latin typeface="Segoe UI Light" pitchFamily="34" charset="0"/>
+                <a:ea typeface="Adobe Myungjo Std M" pitchFamily="18" charset="-128"/>
+              </a:rPr>
+              <a:t> Mobile app is accessible on the go from any mobile device (iPhone, </a:t>
+            </a:r>
+            <a:r>
+              <a:rPr lang="en-US" sz="1200" dirty="0" err="1" smtClean="0">
+                <a:latin typeface="Segoe UI Light" pitchFamily="34" charset="0"/>
+                <a:ea typeface="Adobe Myungjo Std M" pitchFamily="18" charset="-128"/>
+              </a:rPr>
+              <a:t>iPad</a:t>
+            </a:r>
+            <a:r>
+              <a:rPr lang="en-US" sz="1200" dirty="0" smtClean="0">
+                <a:latin typeface="Segoe UI Light" pitchFamily="34" charset="0"/>
+                <a:ea typeface="Adobe Myungjo Std M" pitchFamily="18" charset="-128"/>
+              </a:rPr>
+              <a:t>, Android, Windows Phone and any other device with a browser) by navigating to the </a:t>
+            </a:r>
+            <a:r>
+              <a:rPr lang="en-US" sz="1200" dirty="0" err="1" smtClean="0">
+                <a:latin typeface="Segoe UI Light" pitchFamily="34" charset="0"/>
+                <a:ea typeface="Adobe Myungjo Std M" pitchFamily="18" charset="-128"/>
+              </a:rPr>
+              <a:t>TwoStep</a:t>
+            </a:r>
+            <a:r>
+              <a:rPr lang="en-US" sz="1200" dirty="0" smtClean="0">
+                <a:latin typeface="Segoe UI Light" pitchFamily="34" charset="0"/>
+                <a:ea typeface="Adobe Myungjo Std M" pitchFamily="18" charset="-128"/>
+              </a:rPr>
+              <a:t> website.</a:t>
+            </a:r>
+          </a:p>
+          <a:p>
+            <a:endParaRPr lang="en-US" sz="1200" dirty="0">
+              <a:latin typeface="Segoe UI Light" pitchFamily="34" charset="0"/>
+              <a:ea typeface="Adobe Myungjo Std M" pitchFamily="18" charset="-128"/>
+            </a:endParaRPr>
+          </a:p>
+          <a:p>
+            <a:r>
+              <a:rPr lang="en-US" sz="1200" dirty="0" smtClean="0">
+                <a:latin typeface="Segoe UI Light" pitchFamily="34" charset="0"/>
+                <a:ea typeface="Adobe Myungjo Std M" pitchFamily="18" charset="-128"/>
+              </a:rPr>
+              <a:t>The Mobile app allows you to complete Steps on the go (Call, Schedule, Map) as well as viewing your running Activities and adding new Activities to your Inbox.</a:t>
+            </a:r>
+            <a:endParaRPr lang="en-US" sz="1200" dirty="0">
+              <a:latin typeface="Segoe UI Light" pitchFamily="34" charset="0"/>
+              <a:ea typeface="Adobe Myungjo Std M" pitchFamily="18" charset="-128"/>
+            </a:endParaRPr>
+          </a:p>
+        </p:txBody>
+      </p:sp>
+    </p:spTree>
+    <p:extLst>
+      <p:ext uri="{BB962C8B-B14F-4D97-AF65-F5344CB8AC3E}">
+        <p14:creationId xmlns:p14="http://schemas.microsoft.com/office/powerpoint/2010/main" val="3366242782"/>
+      </p:ext>
+    </p:extLst>
+  </p:cSld>
+  <p:clrMapOvr>
+    <a:masterClrMapping/>
+  </p:clrMapOvr>
+</p:sld>
+</file>
+
+<file path=ppt/slides/slide16.xml><?xml version="1.0" encoding="utf-8"?>
+<p:sld xmlns:a="http://schemas.openxmlformats.org/drawingml/2006/main" xmlns:r="http://schemas.openxmlformats.org/officeDocument/2006/relationships" xmlns:p="http://schemas.openxmlformats.org/presentationml/2006/main">
+  <p:cSld>
+    <p:spTree>
+      <p:nvGrpSpPr>
+        <p:cNvPr id="1" name=""/>
+        <p:cNvGrpSpPr/>
+        <p:nvPr/>
+      </p:nvGrpSpPr>
+      <p:grpSpPr>
+        <a:xfrm>
+          <a:off x="0" y="0"/>
+          <a:ext cx="0" cy="0"/>
+          <a:chOff x="0" y="0"/>
+          <a:chExt cx="0" cy="0"/>
+        </a:xfrm>
+      </p:grpSpPr>
+      <p:pic>
+        <p:nvPicPr>
+          <p:cNvPr id="1029" name="Picture 5"/>
+          <p:cNvPicPr>
+            <a:picLocks noChangeAspect="1" noChangeArrowheads="1"/>
+          </p:cNvPicPr>
+          <p:nvPr/>
+        </p:nvPicPr>
+        <p:blipFill>
+          <a:blip r:embed="rId2">
+            <a:extLst>
+              <a:ext uri="{28A0092B-C50C-407E-A947-70E740481C1C}">
+                <a14:useLocalDpi xmlns:a14="http://schemas.microsoft.com/office/drawing/2010/main" val="0"/>
+              </a:ext>
+            </a:extLst>
+          </a:blip>
+          <a:srcRect/>
+          <a:stretch>
+            <a:fillRect/>
+          </a:stretch>
+        </p:blipFill>
+        <p:spPr bwMode="auto">
+          <a:xfrm>
+            <a:off x="-790575" y="-61913"/>
+            <a:ext cx="10725150" cy="6981826"/>
+          </a:xfrm>
+          <a:prstGeom prst="rect">
+            <a:avLst/>
+          </a:prstGeom>
+          <a:noFill/>
+          <a:ln>
+            <a:noFill/>
+          </a:ln>
+          <a:effectLst/>
+          <a:extLst>
+            <a:ext uri="{909E8E84-426E-40DD-AFC4-6F175D3DCCD1}">
+              <a14:hiddenFill xmlns:a14="http://schemas.microsoft.com/office/drawing/2010/main">
+                <a:solidFill>
+                  <a:schemeClr val="accent1"/>
+                </a:solidFill>
+              </a14:hiddenFill>
+            </a:ext>
+            <a:ext uri="{91240B29-F687-4F45-9708-019B960494DF}">
+              <a14:hiddenLine xmlns:a14="http://schemas.microsoft.com/office/drawing/2010/main" w="9525">
+                <a:solidFill>
+                  <a:schemeClr val="tx1"/>
+                </a:solidFill>
+                <a:miter lim="800000"/>
+                <a:headEnd/>
+                <a:tailEnd/>
+              </a14:hiddenLine>
+            </a:ext>
+            <a:ext uri="{AF507438-7753-43E0-B8FC-AC1667EBCBE1}">
+              <a14:hiddenEffects xmlns:a14="http://schemas.microsoft.com/office/drawing/2010/main">
+                <a:effectLst>
+                  <a:outerShdw dist="35921" dir="2700000" algn="ctr" rotWithShape="0">
+                    <a:schemeClr val="bg2"/>
+                  </a:outerShdw>
+                </a:effectLst>
+              </a14:hiddenEffects>
+            </a:ext>
+          </a:extLst>
+        </p:spPr>
+      </p:pic>
+      <p:sp>
+        <p:nvSpPr>
+          <p:cNvPr id="6" name="TextBox 5"/>
+          <p:cNvSpPr txBox="1"/>
+          <p:nvPr/>
+        </p:nvSpPr>
+        <p:spPr>
+          <a:xfrm>
+            <a:off x="2133600" y="533400"/>
+            <a:ext cx="4153638" cy="461665"/>
+          </a:xfrm>
+          <a:prstGeom prst="rect">
+            <a:avLst/>
+          </a:prstGeom>
+          <a:noFill/>
+        </p:spPr>
+        <p:txBody>
+          <a:bodyPr wrap="none" rtlCol="0">
+            <a:spAutoFit/>
+          </a:bodyPr>
+          <a:lstStyle/>
+          <a:p>
+            <a:r>
+              <a:rPr lang="en-US" sz="2400" dirty="0" smtClean="0">
+                <a:latin typeface="Segoe UI Light" pitchFamily="34" charset="0"/>
+                <a:ea typeface="Adobe Myungjo Std M" pitchFamily="18" charset="-128"/>
+              </a:rPr>
+              <a:t>Hi Omri, Welcome to </a:t>
+            </a:r>
+            <a:r>
+              <a:rPr lang="en-US" sz="2400" dirty="0" err="1" smtClean="0">
+                <a:latin typeface="Segoe UI Light" pitchFamily="34" charset="0"/>
+                <a:ea typeface="Adobe Myungjo Std M" pitchFamily="18" charset="-128"/>
+              </a:rPr>
+              <a:t>TwoStep</a:t>
+            </a:r>
+            <a:r>
+              <a:rPr lang="en-US" sz="2400" dirty="0">
+                <a:latin typeface="Segoe UI Light" pitchFamily="34" charset="0"/>
+                <a:ea typeface="Adobe Myungjo Std M" pitchFamily="18" charset="-128"/>
+              </a:rPr>
+              <a:t>!</a:t>
+            </a:r>
+            <a:endParaRPr lang="en-US" sz="2000" dirty="0">
+              <a:latin typeface="Segoe UI Light" pitchFamily="34" charset="0"/>
+              <a:ea typeface="Adobe Myungjo Std M" pitchFamily="18" charset="-128"/>
+            </a:endParaRPr>
+          </a:p>
+        </p:txBody>
+      </p:sp>
+      <p:sp>
+        <p:nvSpPr>
+          <p:cNvPr id="7" name="TextBox 6"/>
+          <p:cNvSpPr txBox="1"/>
+          <p:nvPr/>
+        </p:nvSpPr>
+        <p:spPr>
+          <a:xfrm>
+            <a:off x="2499027" y="990600"/>
+            <a:ext cx="3977974" cy="338554"/>
+          </a:xfrm>
+          <a:prstGeom prst="rect">
+            <a:avLst/>
+          </a:prstGeom>
+          <a:noFill/>
+        </p:spPr>
+        <p:txBody>
+          <a:bodyPr wrap="square" rtlCol="0">
+            <a:spAutoFit/>
+          </a:bodyPr>
+          <a:lstStyle/>
+          <a:p>
+            <a:r>
+              <a:rPr lang="en-US" sz="1600" dirty="0" smtClean="0">
+                <a:latin typeface="Segoe UI Light" pitchFamily="34" charset="0"/>
+                <a:ea typeface="Adobe Myungjo Std M" pitchFamily="18" charset="-128"/>
+              </a:rPr>
+              <a:t>Here’s a short introduction to the product.  </a:t>
+            </a:r>
+          </a:p>
+        </p:txBody>
+      </p:sp>
+      <p:sp>
+        <p:nvSpPr>
+          <p:cNvPr id="2" name="TextBox 1"/>
+          <p:cNvSpPr txBox="1"/>
+          <p:nvPr/>
+        </p:nvSpPr>
+        <p:spPr>
+          <a:xfrm>
+            <a:off x="2667000" y="1542871"/>
+            <a:ext cx="3733800" cy="1569660"/>
+          </a:xfrm>
+          <a:prstGeom prst="rect">
+            <a:avLst/>
+          </a:prstGeom>
+          <a:noFill/>
+        </p:spPr>
+        <p:txBody>
+          <a:bodyPr wrap="square" rtlCol="0">
+            <a:spAutoFit/>
+          </a:bodyPr>
+          <a:lstStyle/>
+          <a:p>
+            <a:r>
+              <a:rPr lang="en-US" sz="1200" dirty="0" smtClean="0">
+                <a:latin typeface="Segoe UI Light" pitchFamily="34" charset="0"/>
+                <a:ea typeface="Adobe Myungjo Std M" pitchFamily="18" charset="-128"/>
+              </a:rPr>
+              <a:t>That’s it!  While there are more features we can tell you about, you now know enough to get started.  We hope you enjoy using </a:t>
+            </a:r>
+            <a:r>
+              <a:rPr lang="en-US" sz="1200" dirty="0" err="1" smtClean="0">
+                <a:latin typeface="Segoe UI Light" pitchFamily="34" charset="0"/>
+                <a:ea typeface="Adobe Myungjo Std M" pitchFamily="18" charset="-128"/>
+              </a:rPr>
+              <a:t>TwoStep</a:t>
+            </a:r>
+            <a:r>
+              <a:rPr lang="en-US" sz="1200" dirty="0" smtClean="0">
+                <a:latin typeface="Segoe UI Light" pitchFamily="34" charset="0"/>
+                <a:ea typeface="Adobe Myungjo Std M" pitchFamily="18" charset="-128"/>
+              </a:rPr>
+              <a:t> and find it as useful for managing your life as we do.  </a:t>
+            </a:r>
+          </a:p>
+          <a:p>
+            <a:endParaRPr lang="en-US" sz="1200" dirty="0">
+              <a:latin typeface="Segoe UI Light" pitchFamily="34" charset="0"/>
+              <a:ea typeface="Adobe Myungjo Std M" pitchFamily="18" charset="-128"/>
+            </a:endParaRPr>
+          </a:p>
+          <a:p>
+            <a:r>
+              <a:rPr lang="en-US" sz="1200" dirty="0" smtClean="0">
+                <a:latin typeface="Segoe UI Light" pitchFamily="34" charset="0"/>
+                <a:ea typeface="Adobe Myungjo Std M" pitchFamily="18" charset="-128"/>
+              </a:rPr>
+              <a:t>So check out your Organizer, select some Activities and run them, and let </a:t>
+            </a:r>
+            <a:r>
+              <a:rPr lang="en-US" sz="1200" dirty="0" err="1" smtClean="0">
+                <a:latin typeface="Segoe UI Light" pitchFamily="34" charset="0"/>
+                <a:ea typeface="Adobe Myungjo Std M" pitchFamily="18" charset="-128"/>
+              </a:rPr>
+              <a:t>TwoStep</a:t>
+            </a:r>
+            <a:r>
+              <a:rPr lang="en-US" sz="1200" dirty="0" smtClean="0">
+                <a:latin typeface="Segoe UI Light" pitchFamily="34" charset="0"/>
+                <a:ea typeface="Adobe Myungjo Std M" pitchFamily="18" charset="-128"/>
+              </a:rPr>
+              <a:t> help you stay on top of things!</a:t>
+            </a:r>
+            <a:endParaRPr lang="en-US" sz="1200" dirty="0">
+              <a:latin typeface="Segoe UI Light" pitchFamily="34" charset="0"/>
+              <a:ea typeface="Adobe Myungjo Std M" pitchFamily="18" charset="-128"/>
+            </a:endParaRPr>
+          </a:p>
+        </p:txBody>
+      </p:sp>
+    </p:spTree>
+    <p:extLst>
+      <p:ext uri="{BB962C8B-B14F-4D97-AF65-F5344CB8AC3E}">
+        <p14:creationId xmlns:p14="http://schemas.microsoft.com/office/powerpoint/2010/main" val="1550086493"/>
+      </p:ext>
+    </p:extLst>
+  </p:cSld>
+  <p:clrMapOvr>
+    <a:masterClrMapping/>
+  </p:clrMapOvr>
+</p:sld>
+</file>
+
 <file path=ppt/slides/slide2.xml><?xml version="1.0" encoding="utf-8"?>
 <p:sld xmlns:a="http://schemas.openxmlformats.org/drawingml/2006/main" xmlns:r="http://schemas.openxmlformats.org/officeDocument/2006/relationships" xmlns:p="http://schemas.openxmlformats.org/presentationml/2006/main">
   <p:cSld>
@@ -9121,7 +11250,7 @@
         </p:nvSpPr>
         <p:spPr>
           <a:xfrm>
-            <a:off x="609600" y="1305580"/>
+            <a:off x="609600" y="1320225"/>
             <a:ext cx="5473358" cy="584775"/>
           </a:xfrm>
           <a:prstGeom prst="rect">
@@ -9472,6 +11601,1020 @@
     <p:extLst>
       <p:ext uri="{BB962C8B-B14F-4D97-AF65-F5344CB8AC3E}">
         <p14:creationId xmlns:p14="http://schemas.microsoft.com/office/powerpoint/2010/main" val="833534973"/>
+      </p:ext>
+    </p:extLst>
+  </p:cSld>
+  <p:clrMapOvr>
+    <a:masterClrMapping/>
+  </p:clrMapOvr>
+</p:sld>
+</file>
+
+<file path=ppt/slides/slide8.xml><?xml version="1.0" encoding="utf-8"?>
+<p:sld xmlns:a="http://schemas.openxmlformats.org/drawingml/2006/main" xmlns:r="http://schemas.openxmlformats.org/officeDocument/2006/relationships" xmlns:p="http://schemas.openxmlformats.org/presentationml/2006/main">
+  <p:cSld>
+    <p:spTree>
+      <p:nvGrpSpPr>
+        <p:cNvPr id="1" name=""/>
+        <p:cNvGrpSpPr/>
+        <p:nvPr/>
+      </p:nvGrpSpPr>
+      <p:grpSpPr>
+        <a:xfrm>
+          <a:off x="0" y="0"/>
+          <a:ext cx="0" cy="0"/>
+          <a:chOff x="0" y="0"/>
+          <a:chExt cx="0" cy="0"/>
+        </a:xfrm>
+      </p:grpSpPr>
+      <p:pic>
+        <p:nvPicPr>
+          <p:cNvPr id="21" name="Picture 4"/>
+          <p:cNvPicPr>
+            <a:picLocks noChangeAspect="1" noChangeArrowheads="1"/>
+          </p:cNvPicPr>
+          <p:nvPr/>
+        </p:nvPicPr>
+        <p:blipFill>
+          <a:blip r:embed="rId2">
+            <a:extLst>
+              <a:ext uri="{28A0092B-C50C-407E-A947-70E740481C1C}">
+                <a14:useLocalDpi xmlns:a14="http://schemas.microsoft.com/office/drawing/2010/main" val="0"/>
+              </a:ext>
+            </a:extLst>
+          </a:blip>
+          <a:srcRect/>
+          <a:stretch>
+            <a:fillRect/>
+          </a:stretch>
+        </p:blipFill>
+        <p:spPr bwMode="auto">
+          <a:xfrm>
+            <a:off x="228601" y="6200775"/>
+            <a:ext cx="8686799" cy="352425"/>
+          </a:xfrm>
+          <a:prstGeom prst="rect">
+            <a:avLst/>
+          </a:prstGeom>
+          <a:noFill/>
+          <a:ln>
+            <a:noFill/>
+          </a:ln>
+          <a:effectLst/>
+          <a:extLst>
+            <a:ext uri="{909E8E84-426E-40DD-AFC4-6F175D3DCCD1}">
+              <a14:hiddenFill xmlns:a14="http://schemas.microsoft.com/office/drawing/2010/main">
+                <a:solidFill>
+                  <a:schemeClr val="accent1"/>
+                </a:solidFill>
+              </a14:hiddenFill>
+            </a:ext>
+            <a:ext uri="{91240B29-F687-4F45-9708-019B960494DF}">
+              <a14:hiddenLine xmlns:a14="http://schemas.microsoft.com/office/drawing/2010/main" w="9525">
+                <a:solidFill>
+                  <a:schemeClr val="tx1"/>
+                </a:solidFill>
+                <a:miter lim="800000"/>
+                <a:headEnd/>
+                <a:tailEnd/>
+              </a14:hiddenLine>
+            </a:ext>
+            <a:ext uri="{AF507438-7753-43E0-B8FC-AC1667EBCBE1}">
+              <a14:hiddenEffects xmlns:a14="http://schemas.microsoft.com/office/drawing/2010/main">
+                <a:effectLst>
+                  <a:outerShdw dist="35921" dir="2700000" algn="ctr" rotWithShape="0">
+                    <a:schemeClr val="bg2"/>
+                  </a:outerShdw>
+                </a:effectLst>
+              </a14:hiddenEffects>
+            </a:ext>
+          </a:extLst>
+        </p:spPr>
+      </p:pic>
+      <p:sp>
+        <p:nvSpPr>
+          <p:cNvPr id="22" name="Rectangle 21"/>
+          <p:cNvSpPr/>
+          <p:nvPr/>
+        </p:nvSpPr>
+        <p:spPr>
+          <a:xfrm>
+            <a:off x="228600" y="609600"/>
+            <a:ext cx="8686800" cy="5943600"/>
+          </a:xfrm>
+          <a:prstGeom prst="rect">
+            <a:avLst/>
+          </a:prstGeom>
+          <a:noFill/>
+          <a:ln w="57150"/>
+        </p:spPr>
+        <p:style>
+          <a:lnRef idx="2">
+            <a:schemeClr val="accent1">
+              <a:shade val="50000"/>
+            </a:schemeClr>
+          </a:lnRef>
+          <a:fillRef idx="1">
+            <a:schemeClr val="accent1"/>
+          </a:fillRef>
+          <a:effectRef idx="0">
+            <a:schemeClr val="accent1"/>
+          </a:effectRef>
+          <a:fontRef idx="minor">
+            <a:schemeClr val="lt1"/>
+          </a:fontRef>
+        </p:style>
+        <p:txBody>
+          <a:bodyPr rtlCol="0" anchor="ctr"/>
+          <a:lstStyle/>
+          <a:p>
+            <a:pPr algn="ctr"/>
+            <a:endParaRPr lang="en-US"/>
+          </a:p>
+        </p:txBody>
+      </p:sp>
+      <p:grpSp>
+        <p:nvGrpSpPr>
+          <p:cNvPr id="2" name="Group 1"/>
+          <p:cNvGrpSpPr/>
+          <p:nvPr/>
+        </p:nvGrpSpPr>
+        <p:grpSpPr>
+          <a:xfrm>
+            <a:off x="228601" y="609600"/>
+            <a:ext cx="8686800" cy="428625"/>
+            <a:chOff x="228601" y="609600"/>
+            <a:chExt cx="8686800" cy="428625"/>
+          </a:xfrm>
+        </p:grpSpPr>
+        <p:pic>
+          <p:nvPicPr>
+            <p:cNvPr id="29" name="Picture 3"/>
+            <p:cNvPicPr>
+              <a:picLocks noChangeAspect="1" noChangeArrowheads="1"/>
+            </p:cNvPicPr>
+            <p:nvPr/>
+          </p:nvPicPr>
+          <p:blipFill>
+            <a:blip r:embed="rId3">
+              <a:extLst>
+                <a:ext uri="{28A0092B-C50C-407E-A947-70E740481C1C}">
+                  <a14:useLocalDpi xmlns:a14="http://schemas.microsoft.com/office/drawing/2010/main" val="0"/>
+                </a:ext>
+              </a:extLst>
+            </a:blip>
+            <a:srcRect/>
+            <a:stretch>
+              <a:fillRect/>
+            </a:stretch>
+          </p:blipFill>
+          <p:spPr bwMode="auto">
+            <a:xfrm>
+              <a:off x="228601" y="609600"/>
+              <a:ext cx="8686800" cy="428625"/>
+            </a:xfrm>
+            <a:prstGeom prst="rect">
+              <a:avLst/>
+            </a:prstGeom>
+            <a:noFill/>
+            <a:ln>
+              <a:noFill/>
+            </a:ln>
+            <a:effectLst/>
+            <a:extLst>
+              <a:ext uri="{909E8E84-426E-40DD-AFC4-6F175D3DCCD1}">
+                <a14:hiddenFill xmlns:a14="http://schemas.microsoft.com/office/drawing/2010/main">
+                  <a:solidFill>
+                    <a:schemeClr val="accent1"/>
+                  </a:solidFill>
+                </a14:hiddenFill>
+              </a:ext>
+              <a:ext uri="{91240B29-F687-4F45-9708-019B960494DF}">
+                <a14:hiddenLine xmlns:a14="http://schemas.microsoft.com/office/drawing/2010/main" w="9525">
+                  <a:solidFill>
+                    <a:schemeClr val="tx1"/>
+                  </a:solidFill>
+                  <a:miter lim="800000"/>
+                  <a:headEnd/>
+                  <a:tailEnd/>
+                </a14:hiddenLine>
+              </a:ext>
+              <a:ext uri="{AF507438-7753-43E0-B8FC-AC1667EBCBE1}">
+                <a14:hiddenEffects xmlns:a14="http://schemas.microsoft.com/office/drawing/2010/main">
+                  <a:effectLst>
+                    <a:outerShdw dist="35921" dir="2700000" algn="ctr" rotWithShape="0">
+                      <a:schemeClr val="bg2"/>
+                    </a:outerShdw>
+                  </a:effectLst>
+                </a14:hiddenEffects>
+              </a:ext>
+            </a:extLst>
+          </p:spPr>
+        </p:pic>
+        <p:pic>
+          <p:nvPicPr>
+            <p:cNvPr id="2052" name="Picture 4"/>
+            <p:cNvPicPr>
+              <a:picLocks noChangeAspect="1" noChangeArrowheads="1"/>
+            </p:cNvPicPr>
+            <p:nvPr/>
+          </p:nvPicPr>
+          <p:blipFill>
+            <a:blip r:embed="rId4">
+              <a:extLst>
+                <a:ext uri="{28A0092B-C50C-407E-A947-70E740481C1C}">
+                  <a14:useLocalDpi xmlns:a14="http://schemas.microsoft.com/office/drawing/2010/main" val="0"/>
+                </a:ext>
+              </a:extLst>
+            </a:blip>
+            <a:srcRect/>
+            <a:stretch>
+              <a:fillRect/>
+            </a:stretch>
+          </p:blipFill>
+          <p:spPr bwMode="auto">
+            <a:xfrm>
+              <a:off x="265546" y="609600"/>
+              <a:ext cx="3305175" cy="428625"/>
+            </a:xfrm>
+            <a:prstGeom prst="rect">
+              <a:avLst/>
+            </a:prstGeom>
+            <a:noFill/>
+            <a:ln>
+              <a:noFill/>
+            </a:ln>
+            <a:effectLst/>
+            <a:extLst>
+              <a:ext uri="{909E8E84-426E-40DD-AFC4-6F175D3DCCD1}">
+                <a14:hiddenFill xmlns:a14="http://schemas.microsoft.com/office/drawing/2010/main">
+                  <a:solidFill>
+                    <a:schemeClr val="accent1"/>
+                  </a:solidFill>
+                </a14:hiddenFill>
+              </a:ext>
+              <a:ext uri="{91240B29-F687-4F45-9708-019B960494DF}">
+                <a14:hiddenLine xmlns:a14="http://schemas.microsoft.com/office/drawing/2010/main" w="9525">
+                  <a:solidFill>
+                    <a:schemeClr val="tx1"/>
+                  </a:solidFill>
+                  <a:miter lim="800000"/>
+                  <a:headEnd/>
+                  <a:tailEnd/>
+                </a14:hiddenLine>
+              </a:ext>
+              <a:ext uri="{AF507438-7753-43E0-B8FC-AC1667EBCBE1}">
+                <a14:hiddenEffects xmlns:a14="http://schemas.microsoft.com/office/drawing/2010/main">
+                  <a:effectLst>
+                    <a:outerShdw dist="35921" dir="2700000" algn="ctr" rotWithShape="0">
+                      <a:schemeClr val="bg2"/>
+                    </a:outerShdw>
+                  </a:effectLst>
+                </a14:hiddenEffects>
+              </a:ext>
+            </a:extLst>
+          </p:spPr>
+        </p:pic>
+        <p:sp>
+          <p:nvSpPr>
+            <p:cNvPr id="12" name="TextBox 11"/>
+            <p:cNvSpPr txBox="1"/>
+            <p:nvPr/>
+          </p:nvSpPr>
+          <p:spPr>
+            <a:xfrm>
+              <a:off x="609600" y="639247"/>
+              <a:ext cx="1009956" cy="369332"/>
+            </a:xfrm>
+            <a:prstGeom prst="rect">
+              <a:avLst/>
+            </a:prstGeom>
+            <a:noFill/>
+          </p:spPr>
+          <p:txBody>
+            <a:bodyPr wrap="none" rtlCol="0">
+              <a:spAutoFit/>
+            </a:bodyPr>
+            <a:lstStyle/>
+            <a:p>
+              <a:r>
+                <a:rPr lang="en-US" b="1" dirty="0" err="1" smtClean="0">
+                  <a:solidFill>
+                    <a:schemeClr val="bg1"/>
+                  </a:solidFill>
+                  <a:latin typeface="Segoe UI Light" pitchFamily="34" charset="0"/>
+                </a:rPr>
+                <a:t>TwoStep</a:t>
+              </a:r>
+              <a:endParaRPr lang="en-US" b="1" dirty="0">
+                <a:solidFill>
+                  <a:schemeClr val="bg1"/>
+                </a:solidFill>
+                <a:latin typeface="Segoe UI Light" pitchFamily="34" charset="0"/>
+              </a:endParaRPr>
+            </a:p>
+          </p:txBody>
+        </p:sp>
+      </p:grpSp>
+      <p:sp>
+        <p:nvSpPr>
+          <p:cNvPr id="32" name="TextBox 31"/>
+          <p:cNvSpPr txBox="1"/>
+          <p:nvPr/>
+        </p:nvSpPr>
+        <p:spPr>
+          <a:xfrm>
+            <a:off x="609600" y="1305580"/>
+            <a:ext cx="5473358" cy="584775"/>
+          </a:xfrm>
+          <a:prstGeom prst="rect">
+            <a:avLst/>
+          </a:prstGeom>
+          <a:noFill/>
+        </p:spPr>
+        <p:txBody>
+          <a:bodyPr wrap="none" rtlCol="0">
+            <a:spAutoFit/>
+          </a:bodyPr>
+          <a:lstStyle/>
+          <a:p>
+            <a:r>
+              <a:rPr lang="en-US" sz="3200" dirty="0" smtClean="0">
+                <a:latin typeface="Segoe UI Light" pitchFamily="34" charset="0"/>
+                <a:ea typeface="Adobe Myungjo Std M" pitchFamily="18" charset="-128"/>
+              </a:rPr>
+              <a:t>Hi Omri, Welcome to </a:t>
+            </a:r>
+            <a:r>
+              <a:rPr lang="en-US" sz="3200" dirty="0" err="1" smtClean="0">
+                <a:latin typeface="Segoe UI Light" pitchFamily="34" charset="0"/>
+                <a:ea typeface="Adobe Myungjo Std M" pitchFamily="18" charset="-128"/>
+              </a:rPr>
+              <a:t>TwoStep</a:t>
+            </a:r>
+            <a:r>
+              <a:rPr lang="en-US" sz="3200" dirty="0">
+                <a:latin typeface="Segoe UI Light" pitchFamily="34" charset="0"/>
+                <a:ea typeface="Adobe Myungjo Std M" pitchFamily="18" charset="-128"/>
+              </a:rPr>
+              <a:t>!</a:t>
+            </a:r>
+            <a:endParaRPr lang="en-US" sz="2800" dirty="0">
+              <a:latin typeface="Segoe UI Light" pitchFamily="34" charset="0"/>
+              <a:ea typeface="Adobe Myungjo Std M" pitchFamily="18" charset="-128"/>
+            </a:endParaRPr>
+          </a:p>
+        </p:txBody>
+      </p:sp>
+      <p:sp>
+        <p:nvSpPr>
+          <p:cNvPr id="33" name="TextBox 32"/>
+          <p:cNvSpPr txBox="1"/>
+          <p:nvPr/>
+        </p:nvSpPr>
+        <p:spPr>
+          <a:xfrm>
+            <a:off x="609600" y="2023646"/>
+            <a:ext cx="4024628" cy="338554"/>
+          </a:xfrm>
+          <a:prstGeom prst="rect">
+            <a:avLst/>
+          </a:prstGeom>
+          <a:noFill/>
+        </p:spPr>
+        <p:txBody>
+          <a:bodyPr wrap="none" rtlCol="0">
+            <a:spAutoFit/>
+          </a:bodyPr>
+          <a:lstStyle/>
+          <a:p>
+            <a:r>
+              <a:rPr lang="en-US" sz="1600" dirty="0" smtClean="0">
+                <a:latin typeface="Segoe UI Light" pitchFamily="34" charset="0"/>
+                <a:ea typeface="Adobe Myungjo Std M" pitchFamily="18" charset="-128"/>
+              </a:rPr>
+              <a:t>Finally, connect </a:t>
+            </a:r>
+            <a:r>
+              <a:rPr lang="en-US" sz="1600" dirty="0" err="1" smtClean="0">
+                <a:latin typeface="Segoe UI Light" pitchFamily="34" charset="0"/>
+                <a:ea typeface="Adobe Myungjo Std M" pitchFamily="18" charset="-128"/>
+              </a:rPr>
+              <a:t>TwoStep</a:t>
+            </a:r>
+            <a:r>
+              <a:rPr lang="en-US" sz="1600" dirty="0" smtClean="0">
+                <a:latin typeface="Segoe UI Light" pitchFamily="34" charset="0"/>
+                <a:ea typeface="Adobe Myungjo Std M" pitchFamily="18" charset="-128"/>
+              </a:rPr>
+              <a:t> to your digital tools.</a:t>
+            </a:r>
+            <a:endParaRPr lang="en-US" sz="1600" dirty="0">
+              <a:latin typeface="Segoe UI Light" pitchFamily="34" charset="0"/>
+              <a:ea typeface="Adobe Myungjo Std M" pitchFamily="18" charset="-128"/>
+            </a:endParaRPr>
+          </a:p>
+        </p:txBody>
+      </p:sp>
+      <p:sp>
+        <p:nvSpPr>
+          <p:cNvPr id="34" name="Rounded Rectangle 33"/>
+          <p:cNvSpPr/>
+          <p:nvPr/>
+        </p:nvSpPr>
+        <p:spPr>
+          <a:xfrm>
+            <a:off x="690968" y="2514600"/>
+            <a:ext cx="2204632" cy="457200"/>
+          </a:xfrm>
+          <a:prstGeom prst="roundRect">
+            <a:avLst/>
+          </a:prstGeom>
+        </p:spPr>
+        <p:style>
+          <a:lnRef idx="2">
+            <a:schemeClr val="accent1">
+              <a:shade val="50000"/>
+            </a:schemeClr>
+          </a:lnRef>
+          <a:fillRef idx="1">
+            <a:schemeClr val="accent1"/>
+          </a:fillRef>
+          <a:effectRef idx="0">
+            <a:schemeClr val="accent1"/>
+          </a:effectRef>
+          <a:fontRef idx="minor">
+            <a:schemeClr val="lt1"/>
+          </a:fontRef>
+        </p:style>
+        <p:txBody>
+          <a:bodyPr rtlCol="0" anchor="ctr"/>
+          <a:lstStyle/>
+          <a:p>
+            <a:pPr algn="ctr"/>
+            <a:r>
+              <a:rPr lang="en-US" dirty="0" smtClean="0"/>
+              <a:t>Connect to Facebook</a:t>
+            </a:r>
+            <a:endParaRPr lang="en-US" dirty="0"/>
+          </a:p>
+        </p:txBody>
+      </p:sp>
+      <p:sp>
+        <p:nvSpPr>
+          <p:cNvPr id="53" name="TextBox 52"/>
+          <p:cNvSpPr txBox="1"/>
+          <p:nvPr/>
+        </p:nvSpPr>
+        <p:spPr>
+          <a:xfrm>
+            <a:off x="609600" y="3126601"/>
+            <a:ext cx="7516545" cy="461665"/>
+          </a:xfrm>
+          <a:prstGeom prst="rect">
+            <a:avLst/>
+          </a:prstGeom>
+          <a:noFill/>
+        </p:spPr>
+        <p:txBody>
+          <a:bodyPr wrap="none" rtlCol="0">
+            <a:spAutoFit/>
+          </a:bodyPr>
+          <a:lstStyle/>
+          <a:p>
+            <a:r>
+              <a:rPr lang="en-US" sz="1200" dirty="0" smtClean="0">
+                <a:latin typeface="Segoe UI Light" pitchFamily="34" charset="0"/>
+              </a:rPr>
+              <a:t>We highly recommend connecting to Facebook – </a:t>
+            </a:r>
+            <a:r>
+              <a:rPr lang="en-US" sz="1200" dirty="0" err="1" smtClean="0">
+                <a:latin typeface="Segoe UI Light" pitchFamily="34" charset="0"/>
+              </a:rPr>
+              <a:t>TwoStep</a:t>
+            </a:r>
+            <a:r>
+              <a:rPr lang="en-US" sz="1200" dirty="0" smtClean="0">
+                <a:latin typeface="Segoe UI Light" pitchFamily="34" charset="0"/>
+              </a:rPr>
+              <a:t> can do a much better job for you.  We import contacts,</a:t>
+            </a:r>
+          </a:p>
+          <a:p>
+            <a:r>
+              <a:rPr lang="en-US" sz="1200" dirty="0">
+                <a:latin typeface="Segoe UI Light" pitchFamily="34" charset="0"/>
+              </a:rPr>
+              <a:t>y</a:t>
+            </a:r>
+            <a:r>
+              <a:rPr lang="en-US" sz="1200" dirty="0" smtClean="0">
+                <a:latin typeface="Segoe UI Light" pitchFamily="34" charset="0"/>
+              </a:rPr>
+              <a:t>our location, and your family information, and we will NEVER post to Facebook unless you explicitly tell us to.</a:t>
+            </a:r>
+          </a:p>
+        </p:txBody>
+      </p:sp>
+      <p:sp>
+        <p:nvSpPr>
+          <p:cNvPr id="25" name="Rounded Rectangle 24"/>
+          <p:cNvSpPr/>
+          <p:nvPr/>
+        </p:nvSpPr>
+        <p:spPr>
+          <a:xfrm>
+            <a:off x="690968" y="5053749"/>
+            <a:ext cx="990977" cy="428625"/>
+          </a:xfrm>
+          <a:prstGeom prst="roundRect">
+            <a:avLst/>
+          </a:prstGeom>
+          <a:solidFill>
+            <a:srgbClr val="00B050"/>
+          </a:solidFill>
+        </p:spPr>
+        <p:style>
+          <a:lnRef idx="2">
+            <a:schemeClr val="accent1">
+              <a:shade val="50000"/>
+            </a:schemeClr>
+          </a:lnRef>
+          <a:fillRef idx="1">
+            <a:schemeClr val="accent1"/>
+          </a:fillRef>
+          <a:effectRef idx="0">
+            <a:schemeClr val="accent1"/>
+          </a:effectRef>
+          <a:fontRef idx="minor">
+            <a:schemeClr val="lt1"/>
+          </a:fontRef>
+        </p:style>
+        <p:txBody>
+          <a:bodyPr rtlCol="0" anchor="ctr"/>
+          <a:lstStyle/>
+          <a:p>
+            <a:pPr algn="ctr"/>
+            <a:r>
+              <a:rPr lang="en-US" dirty="0" smtClean="0"/>
+              <a:t>Done</a:t>
+            </a:r>
+            <a:endParaRPr lang="en-US" dirty="0"/>
+          </a:p>
+        </p:txBody>
+      </p:sp>
+      <p:sp>
+        <p:nvSpPr>
+          <p:cNvPr id="26" name="Rounded Rectangle 25"/>
+          <p:cNvSpPr/>
+          <p:nvPr/>
+        </p:nvSpPr>
+        <p:spPr>
+          <a:xfrm>
+            <a:off x="690968" y="3733800"/>
+            <a:ext cx="2966632" cy="457200"/>
+          </a:xfrm>
+          <a:prstGeom prst="roundRect">
+            <a:avLst/>
+          </a:prstGeom>
+        </p:spPr>
+        <p:style>
+          <a:lnRef idx="2">
+            <a:schemeClr val="accent1">
+              <a:shade val="50000"/>
+            </a:schemeClr>
+          </a:lnRef>
+          <a:fillRef idx="1">
+            <a:schemeClr val="accent1"/>
+          </a:fillRef>
+          <a:effectRef idx="0">
+            <a:schemeClr val="accent1"/>
+          </a:effectRef>
+          <a:fontRef idx="minor">
+            <a:schemeClr val="lt1"/>
+          </a:fontRef>
+        </p:style>
+        <p:txBody>
+          <a:bodyPr rtlCol="0" anchor="ctr"/>
+          <a:lstStyle/>
+          <a:p>
+            <a:pPr algn="ctr"/>
+            <a:r>
+              <a:rPr lang="en-US" dirty="0" smtClean="0"/>
+              <a:t>Connect to Google Calendar</a:t>
+            </a:r>
+            <a:endParaRPr lang="en-US" dirty="0"/>
+          </a:p>
+        </p:txBody>
+      </p:sp>
+      <p:sp>
+        <p:nvSpPr>
+          <p:cNvPr id="27" name="TextBox 26"/>
+          <p:cNvSpPr txBox="1"/>
+          <p:nvPr/>
+        </p:nvSpPr>
+        <p:spPr>
+          <a:xfrm>
+            <a:off x="609600" y="4345801"/>
+            <a:ext cx="7840544" cy="461665"/>
+          </a:xfrm>
+          <a:prstGeom prst="rect">
+            <a:avLst/>
+          </a:prstGeom>
+          <a:noFill/>
+        </p:spPr>
+        <p:txBody>
+          <a:bodyPr wrap="none" rtlCol="0">
+            <a:spAutoFit/>
+          </a:bodyPr>
+          <a:lstStyle/>
+          <a:p>
+            <a:r>
+              <a:rPr lang="en-US" sz="1200" dirty="0" smtClean="0">
+                <a:latin typeface="Segoe UI Light" pitchFamily="34" charset="0"/>
+              </a:rPr>
+              <a:t>We highly recommend connecting to your Calendar – </a:t>
+            </a:r>
+            <a:r>
+              <a:rPr lang="en-US" sz="1200" dirty="0">
+                <a:latin typeface="Segoe UI Light" pitchFamily="34" charset="0"/>
+              </a:rPr>
+              <a:t>i</a:t>
+            </a:r>
+            <a:r>
+              <a:rPr lang="en-US" sz="1200" dirty="0" smtClean="0">
+                <a:latin typeface="Segoe UI Light" pitchFamily="34" charset="0"/>
+              </a:rPr>
+              <a:t>nstead of having to install another app on your phone, </a:t>
+            </a:r>
+            <a:r>
+              <a:rPr lang="en-US" sz="1200" dirty="0" err="1" smtClean="0">
+                <a:latin typeface="Segoe UI Light" pitchFamily="34" charset="0"/>
+              </a:rPr>
+              <a:t>TwoStep</a:t>
+            </a:r>
+            <a:r>
+              <a:rPr lang="en-US" sz="1200" dirty="0" smtClean="0">
+                <a:latin typeface="Segoe UI Light" pitchFamily="34" charset="0"/>
+              </a:rPr>
+              <a:t> </a:t>
+            </a:r>
+          </a:p>
+          <a:p>
+            <a:r>
+              <a:rPr lang="en-US" sz="1200" dirty="0" smtClean="0">
+                <a:latin typeface="Segoe UI Light" pitchFamily="34" charset="0"/>
+              </a:rPr>
+              <a:t>seamlessly integrates with your Calendar to help you stay on top of the activities in your life.  </a:t>
+            </a:r>
+          </a:p>
+        </p:txBody>
+      </p:sp>
+    </p:spTree>
+    <p:extLst>
+      <p:ext uri="{BB962C8B-B14F-4D97-AF65-F5344CB8AC3E}">
+        <p14:creationId xmlns:p14="http://schemas.microsoft.com/office/powerpoint/2010/main" val="4025993001"/>
+      </p:ext>
+    </p:extLst>
+  </p:cSld>
+  <p:clrMapOvr>
+    <a:masterClrMapping/>
+  </p:clrMapOvr>
+</p:sld>
+</file>
+
+<file path=ppt/slides/slide9.xml><?xml version="1.0" encoding="utf-8"?>
+<p:sld xmlns:a="http://schemas.openxmlformats.org/drawingml/2006/main" xmlns:r="http://schemas.openxmlformats.org/officeDocument/2006/relationships" xmlns:p="http://schemas.openxmlformats.org/presentationml/2006/main">
+  <p:cSld>
+    <p:spTree>
+      <p:nvGrpSpPr>
+        <p:cNvPr id="1" name=""/>
+        <p:cNvGrpSpPr/>
+        <p:nvPr/>
+      </p:nvGrpSpPr>
+      <p:grpSpPr>
+        <a:xfrm>
+          <a:off x="0" y="0"/>
+          <a:ext cx="0" cy="0"/>
+          <a:chOff x="0" y="0"/>
+          <a:chExt cx="0" cy="0"/>
+        </a:xfrm>
+      </p:grpSpPr>
+      <p:pic>
+        <p:nvPicPr>
+          <p:cNvPr id="1029" name="Picture 5"/>
+          <p:cNvPicPr>
+            <a:picLocks noChangeAspect="1" noChangeArrowheads="1"/>
+          </p:cNvPicPr>
+          <p:nvPr/>
+        </p:nvPicPr>
+        <p:blipFill>
+          <a:blip r:embed="rId2">
+            <a:extLst>
+              <a:ext uri="{28A0092B-C50C-407E-A947-70E740481C1C}">
+                <a14:useLocalDpi xmlns:a14="http://schemas.microsoft.com/office/drawing/2010/main" val="0"/>
+              </a:ext>
+            </a:extLst>
+          </a:blip>
+          <a:srcRect/>
+          <a:stretch>
+            <a:fillRect/>
+          </a:stretch>
+        </p:blipFill>
+        <p:spPr bwMode="auto">
+          <a:xfrm>
+            <a:off x="-790575" y="-61913"/>
+            <a:ext cx="10725150" cy="6981826"/>
+          </a:xfrm>
+          <a:prstGeom prst="rect">
+            <a:avLst/>
+          </a:prstGeom>
+          <a:noFill/>
+          <a:ln>
+            <a:noFill/>
+          </a:ln>
+          <a:effectLst/>
+          <a:extLst>
+            <a:ext uri="{909E8E84-426E-40DD-AFC4-6F175D3DCCD1}">
+              <a14:hiddenFill xmlns:a14="http://schemas.microsoft.com/office/drawing/2010/main">
+                <a:solidFill>
+                  <a:schemeClr val="accent1"/>
+                </a:solidFill>
+              </a14:hiddenFill>
+            </a:ext>
+            <a:ext uri="{91240B29-F687-4F45-9708-019B960494DF}">
+              <a14:hiddenLine xmlns:a14="http://schemas.microsoft.com/office/drawing/2010/main" w="9525">
+                <a:solidFill>
+                  <a:schemeClr val="tx1"/>
+                </a:solidFill>
+                <a:miter lim="800000"/>
+                <a:headEnd/>
+                <a:tailEnd/>
+              </a14:hiddenLine>
+            </a:ext>
+            <a:ext uri="{AF507438-7753-43E0-B8FC-AC1667EBCBE1}">
+              <a14:hiddenEffects xmlns:a14="http://schemas.microsoft.com/office/drawing/2010/main">
+                <a:effectLst>
+                  <a:outerShdw dist="35921" dir="2700000" algn="ctr" rotWithShape="0">
+                    <a:schemeClr val="bg2"/>
+                  </a:outerShdw>
+                </a:effectLst>
+              </a14:hiddenEffects>
+            </a:ext>
+          </a:extLst>
+        </p:spPr>
+      </p:pic>
+      <p:sp>
+        <p:nvSpPr>
+          <p:cNvPr id="6" name="TextBox 5"/>
+          <p:cNvSpPr txBox="1"/>
+          <p:nvPr/>
+        </p:nvSpPr>
+        <p:spPr>
+          <a:xfrm>
+            <a:off x="2133600" y="533400"/>
+            <a:ext cx="4153638" cy="461665"/>
+          </a:xfrm>
+          <a:prstGeom prst="rect">
+            <a:avLst/>
+          </a:prstGeom>
+          <a:noFill/>
+        </p:spPr>
+        <p:txBody>
+          <a:bodyPr wrap="none" rtlCol="0">
+            <a:spAutoFit/>
+          </a:bodyPr>
+          <a:lstStyle/>
+          <a:p>
+            <a:r>
+              <a:rPr lang="en-US" sz="2400" dirty="0" smtClean="0">
+                <a:latin typeface="Segoe UI Light" pitchFamily="34" charset="0"/>
+                <a:ea typeface="Adobe Myungjo Std M" pitchFamily="18" charset="-128"/>
+              </a:rPr>
+              <a:t>Hi Omri, Welcome to </a:t>
+            </a:r>
+            <a:r>
+              <a:rPr lang="en-US" sz="2400" dirty="0" err="1" smtClean="0">
+                <a:latin typeface="Segoe UI Light" pitchFamily="34" charset="0"/>
+                <a:ea typeface="Adobe Myungjo Std M" pitchFamily="18" charset="-128"/>
+              </a:rPr>
+              <a:t>TwoStep</a:t>
+            </a:r>
+            <a:r>
+              <a:rPr lang="en-US" sz="2400" dirty="0">
+                <a:latin typeface="Segoe UI Light" pitchFamily="34" charset="0"/>
+                <a:ea typeface="Adobe Myungjo Std M" pitchFamily="18" charset="-128"/>
+              </a:rPr>
+              <a:t>!</a:t>
+            </a:r>
+            <a:endParaRPr lang="en-US" sz="2000" dirty="0">
+              <a:latin typeface="Segoe UI Light" pitchFamily="34" charset="0"/>
+              <a:ea typeface="Adobe Myungjo Std M" pitchFamily="18" charset="-128"/>
+            </a:endParaRPr>
+          </a:p>
+        </p:txBody>
+      </p:sp>
+      <p:sp>
+        <p:nvSpPr>
+          <p:cNvPr id="7" name="TextBox 6"/>
+          <p:cNvSpPr txBox="1"/>
+          <p:nvPr/>
+        </p:nvSpPr>
+        <p:spPr>
+          <a:xfrm>
+            <a:off x="2499027" y="990600"/>
+            <a:ext cx="3977974" cy="338554"/>
+          </a:xfrm>
+          <a:prstGeom prst="rect">
+            <a:avLst/>
+          </a:prstGeom>
+          <a:noFill/>
+        </p:spPr>
+        <p:txBody>
+          <a:bodyPr wrap="square" rtlCol="0">
+            <a:spAutoFit/>
+          </a:bodyPr>
+          <a:lstStyle/>
+          <a:p>
+            <a:r>
+              <a:rPr lang="en-US" sz="1600" dirty="0" smtClean="0">
+                <a:latin typeface="Segoe UI Light" pitchFamily="34" charset="0"/>
+                <a:ea typeface="Adobe Myungjo Std M" pitchFamily="18" charset="-128"/>
+              </a:rPr>
+              <a:t>Here’s a short introduction to the product.  </a:t>
+            </a:r>
+          </a:p>
+        </p:txBody>
+      </p:sp>
+      <p:sp>
+        <p:nvSpPr>
+          <p:cNvPr id="2" name="TextBox 1"/>
+          <p:cNvSpPr txBox="1"/>
+          <p:nvPr/>
+        </p:nvSpPr>
+        <p:spPr>
+          <a:xfrm>
+            <a:off x="4114800" y="1457742"/>
+            <a:ext cx="2438400" cy="2123658"/>
+          </a:xfrm>
+          <a:prstGeom prst="rect">
+            <a:avLst/>
+          </a:prstGeom>
+          <a:noFill/>
+        </p:spPr>
+        <p:txBody>
+          <a:bodyPr wrap="square" rtlCol="0">
+            <a:spAutoFit/>
+          </a:bodyPr>
+          <a:lstStyle/>
+          <a:p>
+            <a:r>
+              <a:rPr lang="en-US" sz="1200" dirty="0" err="1">
+                <a:latin typeface="Segoe UI Light" pitchFamily="34" charset="0"/>
+                <a:ea typeface="Adobe Myungjo Std M" pitchFamily="18" charset="-128"/>
+              </a:rPr>
+              <a:t>TwoStep</a:t>
+            </a:r>
+            <a:r>
+              <a:rPr lang="en-US" sz="1200" dirty="0">
+                <a:latin typeface="Segoe UI Light" pitchFamily="34" charset="0"/>
+                <a:ea typeface="Adobe Myungjo Std M" pitchFamily="18" charset="-128"/>
+              </a:rPr>
+              <a:t> has two main views – the Dashboard </a:t>
+            </a:r>
+            <a:r>
+              <a:rPr lang="en-US" sz="1200" dirty="0" smtClean="0">
+                <a:latin typeface="Segoe UI Light" pitchFamily="34" charset="0"/>
+                <a:ea typeface="Adobe Myungjo Std M" pitchFamily="18" charset="-128"/>
+              </a:rPr>
+              <a:t>(currently displayed), </a:t>
+            </a:r>
+            <a:r>
+              <a:rPr lang="en-US" sz="1200" dirty="0">
+                <a:latin typeface="Segoe UI Light" pitchFamily="34" charset="0"/>
+                <a:ea typeface="Adobe Myungjo Std M" pitchFamily="18" charset="-128"/>
+              </a:rPr>
+              <a:t>and the Next Steps </a:t>
+            </a:r>
+            <a:r>
+              <a:rPr lang="en-US" sz="1200" dirty="0" smtClean="0">
+                <a:latin typeface="Segoe UI Light" pitchFamily="34" charset="0"/>
+                <a:ea typeface="Adobe Myungjo Std M" pitchFamily="18" charset="-128"/>
+              </a:rPr>
+              <a:t>view.  </a:t>
+            </a:r>
+          </a:p>
+          <a:p>
+            <a:endParaRPr lang="en-US" sz="1200" dirty="0">
+              <a:latin typeface="Segoe UI Light" pitchFamily="34" charset="0"/>
+              <a:ea typeface="Adobe Myungjo Std M" pitchFamily="18" charset="-128"/>
+            </a:endParaRPr>
+          </a:p>
+          <a:p>
+            <a:r>
+              <a:rPr lang="en-US" sz="1200" dirty="0" smtClean="0">
+                <a:latin typeface="Segoe UI Light" pitchFamily="34" charset="0"/>
+                <a:ea typeface="Adobe Myungjo Std M" pitchFamily="18" charset="-128"/>
+              </a:rPr>
+              <a:t>In </a:t>
+            </a:r>
+            <a:r>
+              <a:rPr lang="en-US" sz="1200" dirty="0">
+                <a:latin typeface="Segoe UI Light" pitchFamily="34" charset="0"/>
+                <a:ea typeface="Adobe Myungjo Std M" pitchFamily="18" charset="-128"/>
+              </a:rPr>
+              <a:t>the Dashboard, the pane on the left is called the Organizer.  </a:t>
+            </a:r>
+            <a:r>
+              <a:rPr lang="en-US" sz="1200" dirty="0" smtClean="0">
+                <a:latin typeface="Segoe UI Light" pitchFamily="34" charset="0"/>
+                <a:ea typeface="Adobe Myungjo Std M" pitchFamily="18" charset="-128"/>
+              </a:rPr>
+              <a:t>The </a:t>
+            </a:r>
+            <a:r>
+              <a:rPr lang="en-US" sz="1200" dirty="0">
+                <a:latin typeface="Segoe UI Light" pitchFamily="34" charset="0"/>
+                <a:ea typeface="Adobe Myungjo Std M" pitchFamily="18" charset="-128"/>
+              </a:rPr>
+              <a:t>Organizer contains Categories (e.g. Personal, Home), and each Category contains Activities.  Click a Category to view and select the Activities inside.</a:t>
+            </a:r>
+            <a:endParaRPr lang="en-US" sz="1200" dirty="0">
+              <a:latin typeface="Segoe UI Light" pitchFamily="34" charset="0"/>
+              <a:ea typeface="Adobe Myungjo Std M" pitchFamily="18" charset="-128"/>
+            </a:endParaRPr>
+          </a:p>
+        </p:txBody>
+      </p:sp>
+      <p:pic>
+        <p:nvPicPr>
+          <p:cNvPr id="1031" name="Picture 7"/>
+          <p:cNvPicPr>
+            <a:picLocks noChangeAspect="1" noChangeArrowheads="1"/>
+          </p:cNvPicPr>
+          <p:nvPr/>
+        </p:nvPicPr>
+        <p:blipFill>
+          <a:blip r:embed="rId3">
+            <a:extLst>
+              <a:ext uri="{28A0092B-C50C-407E-A947-70E740481C1C}">
+                <a14:useLocalDpi xmlns:a14="http://schemas.microsoft.com/office/drawing/2010/main" val="0"/>
+              </a:ext>
+            </a:extLst>
+          </a:blip>
+          <a:srcRect/>
+          <a:stretch>
+            <a:fillRect/>
+          </a:stretch>
+        </p:blipFill>
+        <p:spPr bwMode="auto">
+          <a:xfrm>
+            <a:off x="2514600" y="1371600"/>
+            <a:ext cx="1600200" cy="2350052"/>
+          </a:xfrm>
+          <a:prstGeom prst="rect">
+            <a:avLst/>
+          </a:prstGeom>
+          <a:noFill/>
+          <a:ln>
+            <a:noFill/>
+          </a:ln>
+          <a:effectLst/>
+          <a:extLst>
+            <a:ext uri="{909E8E84-426E-40DD-AFC4-6F175D3DCCD1}">
+              <a14:hiddenFill xmlns:a14="http://schemas.microsoft.com/office/drawing/2010/main">
+                <a:solidFill>
+                  <a:schemeClr val="accent1"/>
+                </a:solidFill>
+              </a14:hiddenFill>
+            </a:ext>
+            <a:ext uri="{91240B29-F687-4F45-9708-019B960494DF}">
+              <a14:hiddenLine xmlns:a14="http://schemas.microsoft.com/office/drawing/2010/main" w="9525">
+                <a:solidFill>
+                  <a:schemeClr val="tx1"/>
+                </a:solidFill>
+                <a:miter lim="800000"/>
+                <a:headEnd/>
+                <a:tailEnd/>
+              </a14:hiddenLine>
+            </a:ext>
+            <a:ext uri="{AF507438-7753-43E0-B8FC-AC1667EBCBE1}">
+              <a14:hiddenEffects xmlns:a14="http://schemas.microsoft.com/office/drawing/2010/main">
+                <a:effectLst>
+                  <a:outerShdw dist="35921" dir="2700000" algn="ctr" rotWithShape="0">
+                    <a:schemeClr val="bg2"/>
+                  </a:outerShdw>
+                </a:effectLst>
+              </a14:hiddenEffects>
+            </a:ext>
+          </a:extLst>
+        </p:spPr>
+      </p:pic>
+    </p:spTree>
+    <p:extLst>
+      <p:ext uri="{BB962C8B-B14F-4D97-AF65-F5344CB8AC3E}">
+        <p14:creationId xmlns:p14="http://schemas.microsoft.com/office/powerpoint/2010/main" val="2229201360"/>
       </p:ext>
     </p:extLst>
   </p:cSld>

</xml_diff>